<commit_message>
Finished figure 4 and added slides for figure 5
</commit_message>
<xml_diff>
--- a/figure4/ppt/figure4-weight.pptx
+++ b/figure4/ppt/figure4-weight.pptx
@@ -3618,7 +3618,7 @@
         </p:nvGrpSpPr>
         <p:grpSpPr>
           <a:xfrm>
-            <a:off x="-7453313" y="115888"/>
+            <a:off x="-8134351" y="-5429249"/>
             <a:ext cx="24725313" cy="5715000"/>
             <a:chOff x="-7453313" y="115888"/>
             <a:chExt cx="24725313" cy="5715000"/>
@@ -3918,7 +3918,7 @@
         </p:blipFill>
         <p:spPr bwMode="auto">
           <a:xfrm>
-            <a:off x="-7453313" y="4699000"/>
+            <a:off x="-8134351" y="-846137"/>
             <a:ext cx="5715000" cy="5715000"/>
           </a:xfrm>
           <a:prstGeom prst="rect">
@@ -3972,7 +3972,7 @@
         </p:blipFill>
         <p:spPr bwMode="auto">
           <a:xfrm>
-            <a:off x="-2700338" y="4699000"/>
+            <a:off x="-3381376" y="-846137"/>
             <a:ext cx="5715001" cy="5715000"/>
           </a:xfrm>
           <a:prstGeom prst="rect">
@@ -4026,7 +4026,7 @@
         </p:blipFill>
         <p:spPr bwMode="auto">
           <a:xfrm>
-            <a:off x="2051050" y="4699000"/>
+            <a:off x="1370012" y="-846137"/>
             <a:ext cx="5715000" cy="5715000"/>
           </a:xfrm>
           <a:prstGeom prst="rect">
@@ -4080,7 +4080,7 @@
         </p:blipFill>
         <p:spPr bwMode="auto">
           <a:xfrm>
-            <a:off x="6800850" y="4699000"/>
+            <a:off x="6119812" y="-846137"/>
             <a:ext cx="5715000" cy="5715000"/>
           </a:xfrm>
           <a:prstGeom prst="rect">
@@ -4134,7 +4134,7 @@
         </p:blipFill>
         <p:spPr bwMode="auto">
           <a:xfrm>
-            <a:off x="11557000" y="4699000"/>
+            <a:off x="10875962" y="-846137"/>
             <a:ext cx="5715000" cy="5715000"/>
           </a:xfrm>
           <a:prstGeom prst="rect">
@@ -4175,7 +4175,7 @@
         </p:nvSpPr>
         <p:spPr bwMode="auto">
           <a:xfrm>
-            <a:off x="841375" y="65088"/>
+            <a:off x="160337" y="-5480049"/>
             <a:ext cx="8135937" cy="1016000"/>
           </a:xfrm>
           <a:prstGeom prst="rect">
@@ -4344,7 +4344,7 @@
         </p:nvSpPr>
         <p:spPr bwMode="auto">
           <a:xfrm>
-            <a:off x="841375" y="4868863"/>
+            <a:off x="160337" y="-676274"/>
             <a:ext cx="8135937" cy="1016000"/>
           </a:xfrm>
           <a:prstGeom prst="rect">
@@ -4511,291 +4511,271 @@
           </a:p>
         </p:txBody>
       </p:sp>
-      <p:grpSp>
-        <p:nvGrpSpPr>
-          <p:cNvPr id="2" name="组合 1"/>
-          <p:cNvGrpSpPr/>
+      <p:pic>
+        <p:nvPicPr>
+          <p:cNvPr id="20" name="图片 8"/>
+          <p:cNvPicPr>
+            <a:picLocks noChangeAspect="1"/>
+          </p:cNvPicPr>
           <p:nvPr/>
-        </p:nvGrpSpPr>
-        <p:grpSpPr>
-          <a:xfrm>
-            <a:off x="-7453313" y="9739336"/>
-            <a:ext cx="24725313" cy="5715000"/>
-            <a:chOff x="-7381328" y="4851400"/>
-            <a:chExt cx="24725313" cy="5715000"/>
-          </a:xfrm>
-        </p:grpSpPr>
-        <p:pic>
-          <p:nvPicPr>
-            <p:cNvPr id="20" name="图片 8"/>
-            <p:cNvPicPr>
-              <a:picLocks noChangeAspect="1"/>
-            </p:cNvPicPr>
-            <p:nvPr/>
-          </p:nvPicPr>
-          <p:blipFill>
-            <a:blip r:embed="rId7">
-              <a:extLst>
-                <a:ext uri="{28A0092B-C50C-407E-A947-70E740481C1C}">
-                  <a14:useLocalDpi xmlns:a14="http://schemas.microsoft.com/office/drawing/2010/main" val="0"/>
-                </a:ext>
-              </a:extLst>
-            </a:blip>
-            <a:srcRect/>
-            <a:stretch>
-              <a:fillRect/>
-            </a:stretch>
-          </p:blipFill>
-          <p:spPr bwMode="auto">
-            <a:xfrm>
-              <a:off x="-7381328" y="4851400"/>
-              <a:ext cx="5715000" cy="5715000"/>
-            </a:xfrm>
-            <a:prstGeom prst="rect">
-              <a:avLst/>
-            </a:prstGeom>
-            <a:noFill/>
-            <a:ln>
-              <a:noFill/>
-            </a:ln>
+        </p:nvPicPr>
+        <p:blipFill>
+          <a:blip r:embed="rId12">
             <a:extLst>
-              <a:ext uri="{909E8E84-426E-40DD-AFC4-6F175D3DCCD1}">
-                <a14:hiddenFill xmlns:a14="http://schemas.microsoft.com/office/drawing/2010/main">
-                  <a:solidFill>
-                    <a:srgbClr val="FFFFFF"/>
-                  </a:solidFill>
-                </a14:hiddenFill>
-              </a:ext>
-              <a:ext uri="{91240B29-F687-4F45-9708-019B960494DF}">
-                <a14:hiddenLine xmlns:a14="http://schemas.microsoft.com/office/drawing/2010/main" w="9525">
-                  <a:solidFill>
-                    <a:srgbClr val="000000"/>
-                  </a:solidFill>
-                  <a:miter lim="800000"/>
-                  <a:headEnd/>
-                  <a:tailEnd/>
-                </a14:hiddenLine>
+              <a:ext uri="{28A0092B-C50C-407E-A947-70E740481C1C}">
+                <a14:useLocalDpi xmlns:a14="http://schemas.microsoft.com/office/drawing/2010/main" val="0"/>
               </a:ext>
             </a:extLst>
-          </p:spPr>
-        </p:pic>
-        <p:pic>
-          <p:nvPicPr>
-            <p:cNvPr id="21" name="图片 9"/>
-            <p:cNvPicPr>
-              <a:picLocks noChangeAspect="1"/>
-            </p:cNvPicPr>
-            <p:nvPr/>
-          </p:nvPicPr>
-          <p:blipFill>
-            <a:blip r:embed="rId8">
-              <a:extLst>
-                <a:ext uri="{28A0092B-C50C-407E-A947-70E740481C1C}">
-                  <a14:useLocalDpi xmlns:a14="http://schemas.microsoft.com/office/drawing/2010/main" val="0"/>
-                </a:ext>
-              </a:extLst>
-            </a:blip>
-            <a:srcRect/>
-            <a:stretch>
-              <a:fillRect/>
-            </a:stretch>
-          </p:blipFill>
-          <p:spPr bwMode="auto">
-            <a:xfrm>
-              <a:off x="-2628353" y="4851400"/>
-              <a:ext cx="5715001" cy="5715000"/>
-            </a:xfrm>
-            <a:prstGeom prst="rect">
-              <a:avLst/>
-            </a:prstGeom>
+          </a:blip>
+          <a:stretch>
+            <a:fillRect/>
+          </a:stretch>
+        </p:blipFill>
+        <p:spPr bwMode="auto">
+          <a:xfrm>
+            <a:off x="-8134351" y="4194199"/>
+            <a:ext cx="5715000" cy="5715000"/>
+          </a:xfrm>
+          <a:prstGeom prst="rect">
+            <a:avLst/>
+          </a:prstGeom>
+          <a:noFill/>
+          <a:ln>
             <a:noFill/>
-            <a:ln>
-              <a:noFill/>
-            </a:ln>
+          </a:ln>
+          <a:extLst>
+            <a:ext uri="{909E8E84-426E-40DD-AFC4-6F175D3DCCD1}">
+              <a14:hiddenFill xmlns:a14="http://schemas.microsoft.com/office/drawing/2010/main">
+                <a:solidFill>
+                  <a:srgbClr val="FFFFFF"/>
+                </a:solidFill>
+              </a14:hiddenFill>
+            </a:ext>
+            <a:ext uri="{91240B29-F687-4F45-9708-019B960494DF}">
+              <a14:hiddenLine xmlns:a14="http://schemas.microsoft.com/office/drawing/2010/main" w="9525">
+                <a:solidFill>
+                  <a:srgbClr val="000000"/>
+                </a:solidFill>
+                <a:miter lim="800000"/>
+                <a:headEnd/>
+                <a:tailEnd/>
+              </a14:hiddenLine>
+            </a:ext>
+          </a:extLst>
+        </p:spPr>
+      </p:pic>
+      <p:pic>
+        <p:nvPicPr>
+          <p:cNvPr id="21" name="图片 9"/>
+          <p:cNvPicPr>
+            <a:picLocks noChangeAspect="1"/>
+          </p:cNvPicPr>
+          <p:nvPr/>
+        </p:nvPicPr>
+        <p:blipFill>
+          <a:blip r:embed="rId13">
             <a:extLst>
-              <a:ext uri="{909E8E84-426E-40DD-AFC4-6F175D3DCCD1}">
-                <a14:hiddenFill xmlns:a14="http://schemas.microsoft.com/office/drawing/2010/main">
-                  <a:solidFill>
-                    <a:srgbClr val="FFFFFF"/>
-                  </a:solidFill>
-                </a14:hiddenFill>
-              </a:ext>
-              <a:ext uri="{91240B29-F687-4F45-9708-019B960494DF}">
-                <a14:hiddenLine xmlns:a14="http://schemas.microsoft.com/office/drawing/2010/main" w="9525">
-                  <a:solidFill>
-                    <a:srgbClr val="000000"/>
-                  </a:solidFill>
-                  <a:miter lim="800000"/>
-                  <a:headEnd/>
-                  <a:tailEnd/>
-                </a14:hiddenLine>
+              <a:ext uri="{28A0092B-C50C-407E-A947-70E740481C1C}">
+                <a14:useLocalDpi xmlns:a14="http://schemas.microsoft.com/office/drawing/2010/main" val="0"/>
               </a:ext>
             </a:extLst>
-          </p:spPr>
-        </p:pic>
-        <p:pic>
-          <p:nvPicPr>
-            <p:cNvPr id="22" name="图片 10"/>
-            <p:cNvPicPr>
-              <a:picLocks noChangeAspect="1"/>
-            </p:cNvPicPr>
-            <p:nvPr/>
-          </p:nvPicPr>
-          <p:blipFill>
-            <a:blip r:embed="rId9">
-              <a:extLst>
-                <a:ext uri="{28A0092B-C50C-407E-A947-70E740481C1C}">
-                  <a14:useLocalDpi xmlns:a14="http://schemas.microsoft.com/office/drawing/2010/main" val="0"/>
-                </a:ext>
-              </a:extLst>
-            </a:blip>
-            <a:srcRect/>
-            <a:stretch>
-              <a:fillRect/>
-            </a:stretch>
-          </p:blipFill>
-          <p:spPr bwMode="auto">
-            <a:xfrm>
-              <a:off x="2123035" y="4851400"/>
-              <a:ext cx="5715000" cy="5715000"/>
-            </a:xfrm>
-            <a:prstGeom prst="rect">
-              <a:avLst/>
-            </a:prstGeom>
+          </a:blip>
+          <a:stretch>
+            <a:fillRect/>
+          </a:stretch>
+        </p:blipFill>
+        <p:spPr bwMode="auto">
+          <a:xfrm>
+            <a:off x="-3381376" y="4194199"/>
+            <a:ext cx="5715000" cy="5715000"/>
+          </a:xfrm>
+          <a:prstGeom prst="rect">
+            <a:avLst/>
+          </a:prstGeom>
+          <a:noFill/>
+          <a:ln>
             <a:noFill/>
-            <a:ln>
-              <a:noFill/>
-            </a:ln>
+          </a:ln>
+          <a:extLst>
+            <a:ext uri="{909E8E84-426E-40DD-AFC4-6F175D3DCCD1}">
+              <a14:hiddenFill xmlns:a14="http://schemas.microsoft.com/office/drawing/2010/main">
+                <a:solidFill>
+                  <a:srgbClr val="FFFFFF"/>
+                </a:solidFill>
+              </a14:hiddenFill>
+            </a:ext>
+            <a:ext uri="{91240B29-F687-4F45-9708-019B960494DF}">
+              <a14:hiddenLine xmlns:a14="http://schemas.microsoft.com/office/drawing/2010/main" w="9525">
+                <a:solidFill>
+                  <a:srgbClr val="000000"/>
+                </a:solidFill>
+                <a:miter lim="800000"/>
+                <a:headEnd/>
+                <a:tailEnd/>
+              </a14:hiddenLine>
+            </a:ext>
+          </a:extLst>
+        </p:spPr>
+      </p:pic>
+      <p:pic>
+        <p:nvPicPr>
+          <p:cNvPr id="22" name="图片 10"/>
+          <p:cNvPicPr>
+            <a:picLocks noChangeAspect="1"/>
+          </p:cNvPicPr>
+          <p:nvPr/>
+        </p:nvPicPr>
+        <p:blipFill>
+          <a:blip r:embed="rId14">
             <a:extLst>
-              <a:ext uri="{909E8E84-426E-40DD-AFC4-6F175D3DCCD1}">
-                <a14:hiddenFill xmlns:a14="http://schemas.microsoft.com/office/drawing/2010/main">
-                  <a:solidFill>
-                    <a:srgbClr val="FFFFFF"/>
-                  </a:solidFill>
-                </a14:hiddenFill>
-              </a:ext>
-              <a:ext uri="{91240B29-F687-4F45-9708-019B960494DF}">
-                <a14:hiddenLine xmlns:a14="http://schemas.microsoft.com/office/drawing/2010/main" w="9525">
-                  <a:solidFill>
-                    <a:srgbClr val="000000"/>
-                  </a:solidFill>
-                  <a:miter lim="800000"/>
-                  <a:headEnd/>
-                  <a:tailEnd/>
-                </a14:hiddenLine>
+              <a:ext uri="{28A0092B-C50C-407E-A947-70E740481C1C}">
+                <a14:useLocalDpi xmlns:a14="http://schemas.microsoft.com/office/drawing/2010/main" val="0"/>
               </a:ext>
             </a:extLst>
-          </p:spPr>
-        </p:pic>
-        <p:pic>
-          <p:nvPicPr>
-            <p:cNvPr id="23" name="图片 11"/>
-            <p:cNvPicPr>
-              <a:picLocks noChangeAspect="1"/>
-            </p:cNvPicPr>
-            <p:nvPr/>
-          </p:nvPicPr>
-          <p:blipFill>
-            <a:blip r:embed="rId10">
-              <a:extLst>
-                <a:ext uri="{28A0092B-C50C-407E-A947-70E740481C1C}">
-                  <a14:useLocalDpi xmlns:a14="http://schemas.microsoft.com/office/drawing/2010/main" val="0"/>
-                </a:ext>
-              </a:extLst>
-            </a:blip>
-            <a:srcRect/>
-            <a:stretch>
-              <a:fillRect/>
-            </a:stretch>
-          </p:blipFill>
-          <p:spPr bwMode="auto">
-            <a:xfrm>
-              <a:off x="6872835" y="4851400"/>
-              <a:ext cx="5715000" cy="5715000"/>
-            </a:xfrm>
-            <a:prstGeom prst="rect">
-              <a:avLst/>
-            </a:prstGeom>
+          </a:blip>
+          <a:stretch>
+            <a:fillRect/>
+          </a:stretch>
+        </p:blipFill>
+        <p:spPr bwMode="auto">
+          <a:xfrm>
+            <a:off x="1370012" y="4194199"/>
+            <a:ext cx="5715000" cy="5715000"/>
+          </a:xfrm>
+          <a:prstGeom prst="rect">
+            <a:avLst/>
+          </a:prstGeom>
+          <a:noFill/>
+          <a:ln>
             <a:noFill/>
-            <a:ln>
-              <a:noFill/>
-            </a:ln>
+          </a:ln>
+          <a:extLst>
+            <a:ext uri="{909E8E84-426E-40DD-AFC4-6F175D3DCCD1}">
+              <a14:hiddenFill xmlns:a14="http://schemas.microsoft.com/office/drawing/2010/main">
+                <a:solidFill>
+                  <a:srgbClr val="FFFFFF"/>
+                </a:solidFill>
+              </a14:hiddenFill>
+            </a:ext>
+            <a:ext uri="{91240B29-F687-4F45-9708-019B960494DF}">
+              <a14:hiddenLine xmlns:a14="http://schemas.microsoft.com/office/drawing/2010/main" w="9525">
+                <a:solidFill>
+                  <a:srgbClr val="000000"/>
+                </a:solidFill>
+                <a:miter lim="800000"/>
+                <a:headEnd/>
+                <a:tailEnd/>
+              </a14:hiddenLine>
+            </a:ext>
+          </a:extLst>
+        </p:spPr>
+      </p:pic>
+      <p:pic>
+        <p:nvPicPr>
+          <p:cNvPr id="23" name="图片 11"/>
+          <p:cNvPicPr>
+            <a:picLocks noChangeAspect="1"/>
+          </p:cNvPicPr>
+          <p:nvPr/>
+        </p:nvPicPr>
+        <p:blipFill>
+          <a:blip r:embed="rId15">
             <a:extLst>
-              <a:ext uri="{909E8E84-426E-40DD-AFC4-6F175D3DCCD1}">
-                <a14:hiddenFill xmlns:a14="http://schemas.microsoft.com/office/drawing/2010/main">
-                  <a:solidFill>
-                    <a:srgbClr val="FFFFFF"/>
-                  </a:solidFill>
-                </a14:hiddenFill>
-              </a:ext>
-              <a:ext uri="{91240B29-F687-4F45-9708-019B960494DF}">
-                <a14:hiddenLine xmlns:a14="http://schemas.microsoft.com/office/drawing/2010/main" w="9525">
-                  <a:solidFill>
-                    <a:srgbClr val="000000"/>
-                  </a:solidFill>
-                  <a:miter lim="800000"/>
-                  <a:headEnd/>
-                  <a:tailEnd/>
-                </a14:hiddenLine>
+              <a:ext uri="{28A0092B-C50C-407E-A947-70E740481C1C}">
+                <a14:useLocalDpi xmlns:a14="http://schemas.microsoft.com/office/drawing/2010/main" val="0"/>
               </a:ext>
             </a:extLst>
-          </p:spPr>
-        </p:pic>
-        <p:pic>
-          <p:nvPicPr>
-            <p:cNvPr id="24" name="图片 12"/>
-            <p:cNvPicPr>
-              <a:picLocks noChangeAspect="1"/>
-            </p:cNvPicPr>
-            <p:nvPr/>
-          </p:nvPicPr>
-          <p:blipFill>
-            <a:blip r:embed="rId11">
-              <a:extLst>
-                <a:ext uri="{28A0092B-C50C-407E-A947-70E740481C1C}">
-                  <a14:useLocalDpi xmlns:a14="http://schemas.microsoft.com/office/drawing/2010/main" val="0"/>
-                </a:ext>
-              </a:extLst>
-            </a:blip>
-            <a:srcRect/>
-            <a:stretch>
-              <a:fillRect/>
-            </a:stretch>
-          </p:blipFill>
-          <p:spPr bwMode="auto">
-            <a:xfrm>
-              <a:off x="11628985" y="4851400"/>
-              <a:ext cx="5715000" cy="5715000"/>
-            </a:xfrm>
-            <a:prstGeom prst="rect">
-              <a:avLst/>
-            </a:prstGeom>
+          </a:blip>
+          <a:stretch>
+            <a:fillRect/>
+          </a:stretch>
+        </p:blipFill>
+        <p:spPr bwMode="auto">
+          <a:xfrm>
+            <a:off x="6119812" y="4194199"/>
+            <a:ext cx="5715000" cy="5715000"/>
+          </a:xfrm>
+          <a:prstGeom prst="rect">
+            <a:avLst/>
+          </a:prstGeom>
+          <a:noFill/>
+          <a:ln>
             <a:noFill/>
-            <a:ln>
-              <a:noFill/>
-            </a:ln>
+          </a:ln>
+          <a:extLst>
+            <a:ext uri="{909E8E84-426E-40DD-AFC4-6F175D3DCCD1}">
+              <a14:hiddenFill xmlns:a14="http://schemas.microsoft.com/office/drawing/2010/main">
+                <a:solidFill>
+                  <a:srgbClr val="FFFFFF"/>
+                </a:solidFill>
+              </a14:hiddenFill>
+            </a:ext>
+            <a:ext uri="{91240B29-F687-4F45-9708-019B960494DF}">
+              <a14:hiddenLine xmlns:a14="http://schemas.microsoft.com/office/drawing/2010/main" w="9525">
+                <a:solidFill>
+                  <a:srgbClr val="000000"/>
+                </a:solidFill>
+                <a:miter lim="800000"/>
+                <a:headEnd/>
+                <a:tailEnd/>
+              </a14:hiddenLine>
+            </a:ext>
+          </a:extLst>
+        </p:spPr>
+      </p:pic>
+      <p:pic>
+        <p:nvPicPr>
+          <p:cNvPr id="24" name="图片 12"/>
+          <p:cNvPicPr>
+            <a:picLocks noChangeAspect="1"/>
+          </p:cNvPicPr>
+          <p:nvPr/>
+        </p:nvPicPr>
+        <p:blipFill>
+          <a:blip r:embed="rId16">
             <a:extLst>
-              <a:ext uri="{909E8E84-426E-40DD-AFC4-6F175D3DCCD1}">
-                <a14:hiddenFill xmlns:a14="http://schemas.microsoft.com/office/drawing/2010/main">
-                  <a:solidFill>
-                    <a:srgbClr val="FFFFFF"/>
-                  </a:solidFill>
-                </a14:hiddenFill>
-              </a:ext>
-              <a:ext uri="{91240B29-F687-4F45-9708-019B960494DF}">
-                <a14:hiddenLine xmlns:a14="http://schemas.microsoft.com/office/drawing/2010/main" w="9525">
-                  <a:solidFill>
-                    <a:srgbClr val="000000"/>
-                  </a:solidFill>
-                  <a:miter lim="800000"/>
-                  <a:headEnd/>
-                  <a:tailEnd/>
-                </a14:hiddenLine>
+              <a:ext uri="{28A0092B-C50C-407E-A947-70E740481C1C}">
+                <a14:useLocalDpi xmlns:a14="http://schemas.microsoft.com/office/drawing/2010/main" val="0"/>
               </a:ext>
             </a:extLst>
-          </p:spPr>
-        </p:pic>
-      </p:grpSp>
+          </a:blip>
+          <a:stretch>
+            <a:fillRect/>
+          </a:stretch>
+        </p:blipFill>
+        <p:spPr bwMode="auto">
+          <a:xfrm>
+            <a:off x="10875962" y="4194199"/>
+            <a:ext cx="5715000" cy="5715000"/>
+          </a:xfrm>
+          <a:prstGeom prst="rect">
+            <a:avLst/>
+          </a:prstGeom>
+          <a:noFill/>
+          <a:ln>
+            <a:noFill/>
+          </a:ln>
+          <a:extLst>
+            <a:ext uri="{909E8E84-426E-40DD-AFC4-6F175D3DCCD1}">
+              <a14:hiddenFill xmlns:a14="http://schemas.microsoft.com/office/drawing/2010/main">
+                <a:solidFill>
+                  <a:srgbClr val="FFFFFF"/>
+                </a:solidFill>
+              </a14:hiddenFill>
+            </a:ext>
+            <a:ext uri="{91240B29-F687-4F45-9708-019B960494DF}">
+              <a14:hiddenLine xmlns:a14="http://schemas.microsoft.com/office/drawing/2010/main" w="9525">
+                <a:solidFill>
+                  <a:srgbClr val="000000"/>
+                </a:solidFill>
+                <a:miter lim="800000"/>
+                <a:headEnd/>
+                <a:tailEnd/>
+              </a14:hiddenLine>
+            </a:ext>
+          </a:extLst>
+        </p:spPr>
+      </p:pic>
       <p:grpSp>
         <p:nvGrpSpPr>
           <p:cNvPr id="4" name="组合 3"/>
@@ -4804,7 +4784,7 @@
         </p:nvGrpSpPr>
         <p:grpSpPr>
           <a:xfrm>
-            <a:off x="-7453313" y="14374216"/>
+            <a:off x="-8134351" y="8829079"/>
             <a:ext cx="22204363" cy="1016000"/>
             <a:chOff x="-7453313" y="9390063"/>
             <a:chExt cx="22204363" cy="1016000"/>
@@ -5835,7 +5815,7 @@
         </p:nvSpPr>
         <p:spPr bwMode="auto">
           <a:xfrm>
-            <a:off x="841375" y="9829824"/>
+            <a:off x="160337" y="4284687"/>
             <a:ext cx="8135937" cy="1016000"/>
           </a:xfrm>
           <a:prstGeom prst="rect">

</xml_diff>

<commit_message>
Updated all figures and added BE s tractography slides
</commit_message>
<xml_diff>
--- a/figure4/ppt/figure4-weight.pptx
+++ b/figure4/ppt/figure4-weight.pptx
@@ -5618,15 +5618,7 @@
                   <a:schemeClr val="bg1"/>
                 </a:solidFill>
               </a:rPr>
-              <a:t>(a) </a:t>
-            </a:r>
-            <a:r>
-              <a:rPr lang="en-US" altLang="zh-CN" sz="6000" b="1" dirty="0" smtClean="0">
-                <a:solidFill>
-                  <a:schemeClr val="bg1"/>
-                </a:solidFill>
-              </a:rPr>
-              <a:t>DSI-11 </a:t>
+              <a:t>(a) DSI-11 </a:t>
             </a:r>
             <a:r>
               <a:rPr lang="en-US" altLang="zh-CN" sz="6000" b="1" dirty="0">
@@ -5637,36 +5629,12 @@
               <a:t>Ex </a:t>
             </a:r>
             <a:r>
-              <a:rPr lang="en-US" altLang="zh-CN" sz="6000" b="1" dirty="0">
+              <a:rPr lang="en-US" altLang="zh-CN" sz="6000" b="1" dirty="0" smtClean="0">
                 <a:solidFill>
                   <a:schemeClr val="bg1"/>
                 </a:solidFill>
               </a:rPr>
-              <a:t>Vivo (</a:t>
-            </a:r>
-            <a:r>
-              <a:rPr lang="en-US" altLang="zh-CN" sz="6000" b="1" dirty="0" err="1" smtClean="0">
-                <a:solidFill>
-                  <a:schemeClr val="bg1"/>
-                </a:solidFill>
-              </a:rPr>
-              <a:t>G</a:t>
-            </a:r>
-            <a:r>
-              <a:rPr lang="en-US" altLang="zh-CN" sz="6000" b="1" baseline="-25000" dirty="0" err="1" smtClean="0">
-                <a:solidFill>
-                  <a:schemeClr val="bg1"/>
-                </a:solidFill>
-              </a:rPr>
-              <a:t>max</a:t>
-            </a:r>
-            <a:r>
-              <a:rPr lang="en-US" altLang="zh-CN" sz="6000" b="1" dirty="0" smtClean="0">
-                <a:solidFill>
-                  <a:schemeClr val="bg1"/>
-                </a:solidFill>
-              </a:rPr>
-              <a:t>=252mT/m)</a:t>
+              <a:t>Vivo</a:t>
             </a:r>
             <a:endParaRPr lang="zh-CN" altLang="en-US" sz="6000" b="1" dirty="0">
               <a:solidFill>
@@ -5835,7 +5803,15 @@
                   <a:schemeClr val="bg1"/>
                 </a:solidFill>
               </a:rPr>
-              <a:t>(b) DSI-11-b10k </a:t>
+              <a:t>(b) </a:t>
+            </a:r>
+            <a:r>
+              <a:rPr lang="en-US" altLang="zh-CN" sz="6000" b="1" dirty="0" smtClean="0">
+                <a:solidFill>
+                  <a:schemeClr val="bg1"/>
+                </a:solidFill>
+              </a:rPr>
+              <a:t>DSI-11-Gmax225 </a:t>
             </a:r>
             <a:r>
               <a:rPr lang="en-US" altLang="zh-CN" sz="6000" b="1" dirty="0">
@@ -5851,39 +5827,7 @@
                   <a:schemeClr val="bg1"/>
                 </a:solidFill>
               </a:rPr>
-              <a:t>Vivo </a:t>
-            </a:r>
-            <a:r>
-              <a:rPr lang="en-US" altLang="zh-CN" sz="6000" b="1" dirty="0">
-                <a:solidFill>
-                  <a:schemeClr val="bg1"/>
-                </a:solidFill>
-              </a:rPr>
-              <a:t>(</a:t>
-            </a:r>
-            <a:r>
-              <a:rPr lang="en-US" altLang="zh-CN" sz="6000" b="1" dirty="0" err="1">
-                <a:solidFill>
-                  <a:schemeClr val="bg1"/>
-                </a:solidFill>
-              </a:rPr>
-              <a:t>G</a:t>
-            </a:r>
-            <a:r>
-              <a:rPr lang="en-US" altLang="zh-CN" sz="6000" b="1" baseline="-25000" dirty="0" err="1">
-                <a:solidFill>
-                  <a:schemeClr val="bg1"/>
-                </a:solidFill>
-              </a:rPr>
-              <a:t>max</a:t>
-            </a:r>
-            <a:r>
-              <a:rPr lang="en-US" altLang="zh-CN" sz="6000" b="1" dirty="0">
-                <a:solidFill>
-                  <a:schemeClr val="bg1"/>
-                </a:solidFill>
-              </a:rPr>
-              <a:t>=225mT/m)</a:t>
+              <a:t>Vivo</a:t>
             </a:r>
             <a:endParaRPr lang="zh-CN" altLang="en-US" sz="6000" b="1" dirty="0">
               <a:solidFill>
@@ -6052,39 +5996,15 @@
                   <a:schemeClr val="bg1"/>
                 </a:solidFill>
               </a:rPr>
-              <a:t>(c) DSI-11-b7k </a:t>
-            </a:r>
-            <a:r>
-              <a:rPr lang="en-US" altLang="zh-CN" sz="6000" b="1" dirty="0">
+              <a:t>(c) </a:t>
+            </a:r>
+            <a:r>
+              <a:rPr lang="en-US" altLang="zh-CN" sz="6000" b="1" dirty="0" smtClean="0">
                 <a:solidFill>
                   <a:schemeClr val="bg1"/>
                 </a:solidFill>
               </a:rPr>
-              <a:t>In Vivo (</a:t>
-            </a:r>
-            <a:r>
-              <a:rPr lang="en-US" altLang="zh-CN" sz="6000" b="1" dirty="0" err="1">
-                <a:solidFill>
-                  <a:schemeClr val="bg1"/>
-                </a:solidFill>
-              </a:rPr>
-              <a:t>G</a:t>
-            </a:r>
-            <a:r>
-              <a:rPr lang="en-US" altLang="zh-CN" sz="6000" b="1" baseline="-25000" dirty="0" err="1">
-                <a:solidFill>
-                  <a:schemeClr val="bg1"/>
-                </a:solidFill>
-              </a:rPr>
-              <a:t>max</a:t>
-            </a:r>
-            <a:r>
-              <a:rPr lang="en-US" altLang="zh-CN" sz="6000" b="1" dirty="0">
-                <a:solidFill>
-                  <a:schemeClr val="bg1"/>
-                </a:solidFill>
-              </a:rPr>
-              <a:t>=225mT/m)</a:t>
+              <a:t>DSI-11-Gmax40 In Vivo</a:t>
             </a:r>
             <a:endParaRPr lang="zh-CN" altLang="en-US" sz="6000" b="1" dirty="0">
               <a:solidFill>

</xml_diff>

<commit_message>
Finish all figures and submit the revised paper
</commit_message>
<xml_diff>
--- a/figure4/ppt/figure4-weight.pptx
+++ b/figure4/ppt/figure4-weight.pptx
@@ -3612,43 +3612,1370 @@
       </p:grpSpPr>
       <p:grpSp>
         <p:nvGrpSpPr>
-          <p:cNvPr id="3" name="组合 2"/>
+          <p:cNvPr id="7" name="组合 6"/>
           <p:cNvGrpSpPr/>
           <p:nvPr/>
         </p:nvGrpSpPr>
         <p:grpSpPr>
           <a:xfrm>
-            <a:off x="-8134351" y="-5429249"/>
-            <a:ext cx="24725313" cy="5715000"/>
-            <a:chOff x="-7453313" y="115888"/>
-            <a:chExt cx="24725313" cy="5715000"/>
+            <a:off x="-8047897" y="-6614020"/>
+            <a:ext cx="26301417" cy="22455691"/>
+            <a:chOff x="-8047897" y="-6614020"/>
+            <a:chExt cx="26301417" cy="22455691"/>
           </a:xfrm>
         </p:grpSpPr>
+        <p:grpSp>
+          <p:nvGrpSpPr>
+            <p:cNvPr id="6" name="组合 5"/>
+            <p:cNvGrpSpPr/>
+            <p:nvPr/>
+          </p:nvGrpSpPr>
+          <p:grpSpPr>
+            <a:xfrm>
+              <a:off x="-8047897" y="-5429249"/>
+              <a:ext cx="26301417" cy="6869320"/>
+              <a:chOff x="-8047897" y="-5429249"/>
+              <a:chExt cx="26301417" cy="6869320"/>
+            </a:xfrm>
+          </p:grpSpPr>
+          <p:pic>
+            <p:nvPicPr>
+              <p:cNvPr id="2054" name="图片 7"/>
+              <p:cNvPicPr>
+                <a:picLocks noChangeAspect="1"/>
+              </p:cNvPicPr>
+              <p:nvPr/>
+            </p:nvPicPr>
+            <p:blipFill>
+              <a:blip r:embed="rId2">
+                <a:extLst>
+                  <a:ext uri="{28A0092B-C50C-407E-A947-70E740481C1C}">
+                    <a14:useLocalDpi xmlns:a14="http://schemas.microsoft.com/office/drawing/2010/main" val="0"/>
+                  </a:ext>
+                </a:extLst>
+              </a:blip>
+              <a:stretch>
+                <a:fillRect/>
+              </a:stretch>
+            </p:blipFill>
+            <p:spPr bwMode="auto">
+              <a:xfrm>
+                <a:off x="13094725" y="-5429249"/>
+                <a:ext cx="5158795" cy="5715000"/>
+              </a:xfrm>
+              <a:prstGeom prst="rect">
+                <a:avLst/>
+              </a:prstGeom>
+              <a:noFill/>
+              <a:ln>
+                <a:noFill/>
+              </a:ln>
+              <a:extLst>
+                <a:ext uri="{909E8E84-426E-40DD-AFC4-6F175D3DCCD1}">
+                  <a14:hiddenFill xmlns:a14="http://schemas.microsoft.com/office/drawing/2010/main">
+                    <a:solidFill>
+                      <a:srgbClr val="FFFFFF"/>
+                    </a:solidFill>
+                  </a14:hiddenFill>
+                </a:ext>
+                <a:ext uri="{91240B29-F687-4F45-9708-019B960494DF}">
+                  <a14:hiddenLine xmlns:a14="http://schemas.microsoft.com/office/drawing/2010/main" w="9525">
+                    <a:solidFill>
+                      <a:srgbClr val="000000"/>
+                    </a:solidFill>
+                    <a:miter lim="800000"/>
+                    <a:headEnd/>
+                    <a:tailEnd/>
+                  </a14:hiddenLine>
+                </a:ext>
+              </a:extLst>
+            </p:spPr>
+          </p:pic>
+          <p:pic>
+            <p:nvPicPr>
+              <p:cNvPr id="31" name="图片 30"/>
+              <p:cNvPicPr>
+                <a:picLocks noChangeAspect="1"/>
+              </p:cNvPicPr>
+              <p:nvPr/>
+            </p:nvPicPr>
+            <p:blipFill>
+              <a:blip r:embed="rId3" cstate="print">
+                <a:extLst>
+                  <a:ext uri="{28A0092B-C50C-407E-A947-70E740481C1C}">
+                    <a14:useLocalDpi xmlns:a14="http://schemas.microsoft.com/office/drawing/2010/main" val="0"/>
+                  </a:ext>
+                </a:extLst>
+              </a:blip>
+              <a:stretch>
+                <a:fillRect/>
+              </a:stretch>
+            </p:blipFill>
+            <p:spPr>
+              <a:xfrm>
+                <a:off x="-7583251" y="-2553977"/>
+                <a:ext cx="1418750" cy="1511026"/>
+              </a:xfrm>
+              <a:prstGeom prst="rect">
+                <a:avLst/>
+              </a:prstGeom>
+            </p:spPr>
+          </p:pic>
+          <p:pic>
+            <p:nvPicPr>
+              <p:cNvPr id="2050" name="图片 1"/>
+              <p:cNvPicPr>
+                <a:picLocks noChangeAspect="1"/>
+              </p:cNvPicPr>
+              <p:nvPr/>
+            </p:nvPicPr>
+            <p:blipFill>
+              <a:blip r:embed="rId4">
+                <a:extLst>
+                  <a:ext uri="{28A0092B-C50C-407E-A947-70E740481C1C}">
+                    <a14:useLocalDpi xmlns:a14="http://schemas.microsoft.com/office/drawing/2010/main" val="0"/>
+                  </a:ext>
+                </a:extLst>
+              </a:blip>
+              <a:stretch>
+                <a:fillRect/>
+              </a:stretch>
+            </p:blipFill>
+            <p:spPr bwMode="auto">
+              <a:xfrm>
+                <a:off x="-8047897" y="-5411477"/>
+                <a:ext cx="5158795" cy="5715000"/>
+              </a:xfrm>
+              <a:prstGeom prst="rect">
+                <a:avLst/>
+              </a:prstGeom>
+              <a:noFill/>
+              <a:ln>
+                <a:noFill/>
+              </a:ln>
+              <a:extLst>
+                <a:ext uri="{909E8E84-426E-40DD-AFC4-6F175D3DCCD1}">
+                  <a14:hiddenFill xmlns:a14="http://schemas.microsoft.com/office/drawing/2010/main">
+                    <a:solidFill>
+                      <a:srgbClr val="FFFFFF"/>
+                    </a:solidFill>
+                  </a14:hiddenFill>
+                </a:ext>
+                <a:ext uri="{91240B29-F687-4F45-9708-019B960494DF}">
+                  <a14:hiddenLine xmlns:a14="http://schemas.microsoft.com/office/drawing/2010/main" w="9525">
+                    <a:solidFill>
+                      <a:srgbClr val="000000"/>
+                    </a:solidFill>
+                    <a:miter lim="800000"/>
+                    <a:headEnd/>
+                    <a:tailEnd/>
+                  </a14:hiddenLine>
+                </a:ext>
+              </a:extLst>
+            </p:spPr>
+          </p:pic>
+          <p:pic>
+            <p:nvPicPr>
+              <p:cNvPr id="2051" name="图片 2"/>
+              <p:cNvPicPr>
+                <a:picLocks noChangeAspect="1"/>
+              </p:cNvPicPr>
+              <p:nvPr/>
+            </p:nvPicPr>
+            <p:blipFill>
+              <a:blip r:embed="rId5">
+                <a:extLst>
+                  <a:ext uri="{28A0092B-C50C-407E-A947-70E740481C1C}">
+                    <a14:useLocalDpi xmlns:a14="http://schemas.microsoft.com/office/drawing/2010/main" val="0"/>
+                  </a:ext>
+                </a:extLst>
+              </a:blip>
+              <a:stretch>
+                <a:fillRect/>
+              </a:stretch>
+            </p:blipFill>
+            <p:spPr bwMode="auto">
+              <a:xfrm>
+                <a:off x="-2762242" y="-5411477"/>
+                <a:ext cx="5158795" cy="5715000"/>
+              </a:xfrm>
+              <a:prstGeom prst="rect">
+                <a:avLst/>
+              </a:prstGeom>
+              <a:noFill/>
+              <a:ln>
+                <a:noFill/>
+              </a:ln>
+              <a:extLst>
+                <a:ext uri="{909E8E84-426E-40DD-AFC4-6F175D3DCCD1}">
+                  <a14:hiddenFill xmlns:a14="http://schemas.microsoft.com/office/drawing/2010/main">
+                    <a:solidFill>
+                      <a:srgbClr val="FFFFFF"/>
+                    </a:solidFill>
+                  </a14:hiddenFill>
+                </a:ext>
+                <a:ext uri="{91240B29-F687-4F45-9708-019B960494DF}">
+                  <a14:hiddenLine xmlns:a14="http://schemas.microsoft.com/office/drawing/2010/main" w="9525">
+                    <a:solidFill>
+                      <a:srgbClr val="000000"/>
+                    </a:solidFill>
+                    <a:miter lim="800000"/>
+                    <a:headEnd/>
+                    <a:tailEnd/>
+                  </a14:hiddenLine>
+                </a:ext>
+              </a:extLst>
+            </p:spPr>
+          </p:pic>
+          <p:pic>
+            <p:nvPicPr>
+              <p:cNvPr id="2052" name="图片 5"/>
+              <p:cNvPicPr>
+                <a:picLocks noChangeAspect="1"/>
+              </p:cNvPicPr>
+              <p:nvPr/>
+            </p:nvPicPr>
+            <p:blipFill>
+              <a:blip r:embed="rId6">
+                <a:extLst>
+                  <a:ext uri="{28A0092B-C50C-407E-A947-70E740481C1C}">
+                    <a14:useLocalDpi xmlns:a14="http://schemas.microsoft.com/office/drawing/2010/main" val="0"/>
+                  </a:ext>
+                </a:extLst>
+              </a:blip>
+              <a:stretch>
+                <a:fillRect/>
+              </a:stretch>
+            </p:blipFill>
+            <p:spPr bwMode="auto">
+              <a:xfrm>
+                <a:off x="2523414" y="-5411477"/>
+                <a:ext cx="5158795" cy="5715000"/>
+              </a:xfrm>
+              <a:prstGeom prst="rect">
+                <a:avLst/>
+              </a:prstGeom>
+              <a:noFill/>
+              <a:ln>
+                <a:noFill/>
+              </a:ln>
+              <a:extLst>
+                <a:ext uri="{909E8E84-426E-40DD-AFC4-6F175D3DCCD1}">
+                  <a14:hiddenFill xmlns:a14="http://schemas.microsoft.com/office/drawing/2010/main">
+                    <a:solidFill>
+                      <a:srgbClr val="FFFFFF"/>
+                    </a:solidFill>
+                  </a14:hiddenFill>
+                </a:ext>
+                <a:ext uri="{91240B29-F687-4F45-9708-019B960494DF}">
+                  <a14:hiddenLine xmlns:a14="http://schemas.microsoft.com/office/drawing/2010/main" w="9525">
+                    <a:solidFill>
+                      <a:srgbClr val="000000"/>
+                    </a:solidFill>
+                    <a:miter lim="800000"/>
+                    <a:headEnd/>
+                    <a:tailEnd/>
+                  </a14:hiddenLine>
+                </a:ext>
+              </a:extLst>
+            </p:spPr>
+          </p:pic>
+          <p:pic>
+            <p:nvPicPr>
+              <p:cNvPr id="2053" name="图片 6"/>
+              <p:cNvPicPr>
+                <a:picLocks noChangeAspect="1"/>
+              </p:cNvPicPr>
+              <p:nvPr/>
+            </p:nvPicPr>
+            <p:blipFill>
+              <a:blip r:embed="rId7">
+                <a:extLst>
+                  <a:ext uri="{28A0092B-C50C-407E-A947-70E740481C1C}">
+                    <a14:useLocalDpi xmlns:a14="http://schemas.microsoft.com/office/drawing/2010/main" val="0"/>
+                  </a:ext>
+                </a:extLst>
+              </a:blip>
+              <a:stretch>
+                <a:fillRect/>
+              </a:stretch>
+            </p:blipFill>
+            <p:spPr bwMode="auto">
+              <a:xfrm>
+                <a:off x="7809070" y="-5411477"/>
+                <a:ext cx="5158795" cy="5715000"/>
+              </a:xfrm>
+              <a:prstGeom prst="rect">
+                <a:avLst/>
+              </a:prstGeom>
+              <a:noFill/>
+              <a:ln>
+                <a:noFill/>
+              </a:ln>
+              <a:extLst>
+                <a:ext uri="{909E8E84-426E-40DD-AFC4-6F175D3DCCD1}">
+                  <a14:hiddenFill xmlns:a14="http://schemas.microsoft.com/office/drawing/2010/main">
+                    <a:solidFill>
+                      <a:srgbClr val="FFFFFF"/>
+                    </a:solidFill>
+                  </a14:hiddenFill>
+                </a:ext>
+                <a:ext uri="{91240B29-F687-4F45-9708-019B960494DF}">
+                  <a14:hiddenLine xmlns:a14="http://schemas.microsoft.com/office/drawing/2010/main" w="9525">
+                    <a:solidFill>
+                      <a:srgbClr val="000000"/>
+                    </a:solidFill>
+                    <a:miter lim="800000"/>
+                    <a:headEnd/>
+                    <a:tailEnd/>
+                  </a14:hiddenLine>
+                </a:ext>
+              </a:extLst>
+            </p:spPr>
+          </p:pic>
+          <p:sp>
+            <p:nvSpPr>
+              <p:cNvPr id="2065" name="TextBox 17"/>
+              <p:cNvSpPr txBox="1">
+                <a:spLocks noChangeArrowheads="1"/>
+              </p:cNvSpPr>
+              <p:nvPr/>
+            </p:nvSpPr>
+            <p:spPr bwMode="auto">
+              <a:xfrm>
+                <a:off x="-8047897" y="116632"/>
+                <a:ext cx="26282920" cy="1323439"/>
+              </a:xfrm>
+              <a:prstGeom prst="rect">
+                <a:avLst/>
+              </a:prstGeom>
+              <a:noFill/>
+              <a:ln>
+                <a:noFill/>
+              </a:ln>
+              <a:extLst>
+                <a:ext uri="{909E8E84-426E-40DD-AFC4-6F175D3DCCD1}">
+                  <a14:hiddenFill xmlns:a14="http://schemas.microsoft.com/office/drawing/2010/main">
+                    <a:solidFill>
+                      <a:srgbClr val="FFFFFF"/>
+                    </a:solidFill>
+                  </a14:hiddenFill>
+                </a:ext>
+                <a:ext uri="{91240B29-F687-4F45-9708-019B960494DF}">
+                  <a14:hiddenLine xmlns:a14="http://schemas.microsoft.com/office/drawing/2010/main" w="9525">
+                    <a:solidFill>
+                      <a:srgbClr val="000000"/>
+                    </a:solidFill>
+                    <a:miter lim="800000"/>
+                    <a:headEnd/>
+                    <a:tailEnd/>
+                  </a14:hiddenLine>
+                </a:ext>
+              </a:extLst>
+            </p:spPr>
+            <p:txBody>
+              <a:bodyPr wrap="square">
+                <a:spAutoFit/>
+              </a:bodyPr>
+              <a:lstStyle>
+                <a:lvl1pPr eaLnBrk="0" hangingPunct="0">
+                  <a:defRPr>
+                    <a:solidFill>
+                      <a:schemeClr val="tx1"/>
+                    </a:solidFill>
+                    <a:latin typeface="Arial" charset="0"/>
+                    <a:ea typeface="宋体" pitchFamily="2" charset="-122"/>
+                  </a:defRPr>
+                </a:lvl1pPr>
+                <a:lvl2pPr marL="742950" indent="-285750" eaLnBrk="0" hangingPunct="0">
+                  <a:defRPr>
+                    <a:solidFill>
+                      <a:schemeClr val="tx1"/>
+                    </a:solidFill>
+                    <a:latin typeface="Arial" charset="0"/>
+                    <a:ea typeface="宋体" pitchFamily="2" charset="-122"/>
+                  </a:defRPr>
+                </a:lvl2pPr>
+                <a:lvl3pPr marL="1143000" indent="-228600" eaLnBrk="0" hangingPunct="0">
+                  <a:defRPr>
+                    <a:solidFill>
+                      <a:schemeClr val="tx1"/>
+                    </a:solidFill>
+                    <a:latin typeface="Arial" charset="0"/>
+                    <a:ea typeface="宋体" pitchFamily="2" charset="-122"/>
+                  </a:defRPr>
+                </a:lvl3pPr>
+                <a:lvl4pPr marL="1600200" indent="-228600" eaLnBrk="0" hangingPunct="0">
+                  <a:defRPr>
+                    <a:solidFill>
+                      <a:schemeClr val="tx1"/>
+                    </a:solidFill>
+                    <a:latin typeface="Arial" charset="0"/>
+                    <a:ea typeface="宋体" pitchFamily="2" charset="-122"/>
+                  </a:defRPr>
+                </a:lvl4pPr>
+                <a:lvl5pPr marL="2057400" indent="-228600" eaLnBrk="0" hangingPunct="0">
+                  <a:defRPr>
+                    <a:solidFill>
+                      <a:schemeClr val="tx1"/>
+                    </a:solidFill>
+                    <a:latin typeface="Arial" charset="0"/>
+                    <a:ea typeface="宋体" pitchFamily="2" charset="-122"/>
+                  </a:defRPr>
+                </a:lvl5pPr>
+                <a:lvl6pPr marL="2514600" indent="-228600" eaLnBrk="0" fontAlgn="base" hangingPunct="0">
+                  <a:spcBef>
+                    <a:spcPct val="0"/>
+                  </a:spcBef>
+                  <a:spcAft>
+                    <a:spcPct val="0"/>
+                  </a:spcAft>
+                  <a:defRPr>
+                    <a:solidFill>
+                      <a:schemeClr val="tx1"/>
+                    </a:solidFill>
+                    <a:latin typeface="Arial" charset="0"/>
+                    <a:ea typeface="宋体" pitchFamily="2" charset="-122"/>
+                  </a:defRPr>
+                </a:lvl6pPr>
+                <a:lvl7pPr marL="2971800" indent="-228600" eaLnBrk="0" fontAlgn="base" hangingPunct="0">
+                  <a:spcBef>
+                    <a:spcPct val="0"/>
+                  </a:spcBef>
+                  <a:spcAft>
+                    <a:spcPct val="0"/>
+                  </a:spcAft>
+                  <a:defRPr>
+                    <a:solidFill>
+                      <a:schemeClr val="tx1"/>
+                    </a:solidFill>
+                    <a:latin typeface="Arial" charset="0"/>
+                    <a:ea typeface="宋体" pitchFamily="2" charset="-122"/>
+                  </a:defRPr>
+                </a:lvl7pPr>
+                <a:lvl8pPr marL="3429000" indent="-228600" eaLnBrk="0" fontAlgn="base" hangingPunct="0">
+                  <a:spcBef>
+                    <a:spcPct val="0"/>
+                  </a:spcBef>
+                  <a:spcAft>
+                    <a:spcPct val="0"/>
+                  </a:spcAft>
+                  <a:defRPr>
+                    <a:solidFill>
+                      <a:schemeClr val="tx1"/>
+                    </a:solidFill>
+                    <a:latin typeface="Arial" charset="0"/>
+                    <a:ea typeface="宋体" pitchFamily="2" charset="-122"/>
+                  </a:defRPr>
+                </a:lvl8pPr>
+                <a:lvl9pPr marL="3886200" indent="-228600" eaLnBrk="0" fontAlgn="base" hangingPunct="0">
+                  <a:spcBef>
+                    <a:spcPct val="0"/>
+                  </a:spcBef>
+                  <a:spcAft>
+                    <a:spcPct val="0"/>
+                  </a:spcAft>
+                  <a:defRPr>
+                    <a:solidFill>
+                      <a:schemeClr val="tx1"/>
+                    </a:solidFill>
+                    <a:latin typeface="Arial" charset="0"/>
+                    <a:ea typeface="宋体" pitchFamily="2" charset="-122"/>
+                  </a:defRPr>
+                </a:lvl9pPr>
+              </a:lstStyle>
+              <a:p>
+                <a:pPr algn="ctr" eaLnBrk="1" hangingPunct="1"/>
+                <a:r>
+                  <a:rPr lang="en-US" altLang="zh-CN" sz="8000" b="1" dirty="0" smtClean="0"/>
+                  <a:t>(a) DSI-11 </a:t>
+                </a:r>
+                <a:r>
+                  <a:rPr lang="en-US" altLang="zh-CN" sz="8000" b="1" dirty="0"/>
+                  <a:t>Ex </a:t>
+                </a:r>
+                <a:r>
+                  <a:rPr lang="en-US" altLang="zh-CN" sz="8000" b="1" dirty="0" smtClean="0"/>
+                  <a:t>Vivo</a:t>
+                </a:r>
+                <a:endParaRPr lang="zh-CN" altLang="en-US" sz="8000" b="1" dirty="0"/>
+              </a:p>
+            </p:txBody>
+          </p:sp>
+          <p:pic>
+            <p:nvPicPr>
+              <p:cNvPr id="33" name="图片 7"/>
+              <p:cNvPicPr>
+                <a:picLocks noChangeAspect="1"/>
+              </p:cNvPicPr>
+              <p:nvPr/>
+            </p:nvPicPr>
+            <p:blipFill>
+              <a:blip r:embed="rId2">
+                <a:extLst>
+                  <a:ext uri="{28A0092B-C50C-407E-A947-70E740481C1C}">
+                    <a14:useLocalDpi xmlns:a14="http://schemas.microsoft.com/office/drawing/2010/main" val="0"/>
+                  </a:ext>
+                </a:extLst>
+              </a:blip>
+              <a:stretch>
+                <a:fillRect/>
+              </a:stretch>
+            </p:blipFill>
+            <p:spPr bwMode="auto">
+              <a:xfrm>
+                <a:off x="13094725" y="-5411476"/>
+                <a:ext cx="5158795" cy="5714999"/>
+              </a:xfrm>
+              <a:prstGeom prst="rect">
+                <a:avLst/>
+              </a:prstGeom>
+              <a:noFill/>
+              <a:ln>
+                <a:noFill/>
+              </a:ln>
+              <a:extLst>
+                <a:ext uri="{909E8E84-426E-40DD-AFC4-6F175D3DCCD1}">
+                  <a14:hiddenFill xmlns:a14="http://schemas.microsoft.com/office/drawing/2010/main">
+                    <a:solidFill>
+                      <a:srgbClr val="FFFFFF"/>
+                    </a:solidFill>
+                  </a14:hiddenFill>
+                </a:ext>
+                <a:ext uri="{91240B29-F687-4F45-9708-019B960494DF}">
+                  <a14:hiddenLine xmlns:a14="http://schemas.microsoft.com/office/drawing/2010/main" w="9525">
+                    <a:solidFill>
+                      <a:srgbClr val="000000"/>
+                    </a:solidFill>
+                    <a:miter lim="800000"/>
+                    <a:headEnd/>
+                    <a:tailEnd/>
+                  </a14:hiddenLine>
+                </a:ext>
+              </a:extLst>
+            </p:spPr>
+          </p:pic>
+        </p:grpSp>
+        <p:grpSp>
+          <p:nvGrpSpPr>
+            <p:cNvPr id="5" name="组合 4"/>
+            <p:cNvGrpSpPr/>
+            <p:nvPr/>
+          </p:nvGrpSpPr>
+          <p:grpSpPr>
+            <a:xfrm>
+              <a:off x="-8047897" y="-6614020"/>
+              <a:ext cx="26299838" cy="1107996"/>
+              <a:chOff x="-8047897" y="-6614020"/>
+              <a:chExt cx="26299838" cy="1107996"/>
+            </a:xfrm>
+          </p:grpSpPr>
+          <p:sp>
+            <p:nvSpPr>
+              <p:cNvPr id="2061" name="TextBox 16"/>
+              <p:cNvSpPr txBox="1">
+                <a:spLocks noChangeArrowheads="1"/>
+              </p:cNvSpPr>
+              <p:nvPr/>
+            </p:nvSpPr>
+            <p:spPr bwMode="auto">
+              <a:xfrm>
+                <a:off x="-2762242" y="-6614020"/>
+                <a:ext cx="5157216" cy="1107996"/>
+              </a:xfrm>
+              <a:prstGeom prst="rect">
+                <a:avLst/>
+              </a:prstGeom>
+              <a:solidFill>
+                <a:schemeClr val="tx1"/>
+              </a:solidFill>
+              <a:ln>
+                <a:noFill/>
+              </a:ln>
+              <a:extLst/>
+            </p:spPr>
+            <p:txBody>
+              <a:bodyPr>
+                <a:spAutoFit/>
+              </a:bodyPr>
+              <a:lstStyle>
+                <a:lvl1pPr eaLnBrk="0" hangingPunct="0">
+                  <a:defRPr>
+                    <a:solidFill>
+                      <a:schemeClr val="tx1"/>
+                    </a:solidFill>
+                    <a:latin typeface="Arial" charset="0"/>
+                    <a:ea typeface="宋体" pitchFamily="2" charset="-122"/>
+                  </a:defRPr>
+                </a:lvl1pPr>
+                <a:lvl2pPr marL="742950" indent="-285750" eaLnBrk="0" hangingPunct="0">
+                  <a:defRPr>
+                    <a:solidFill>
+                      <a:schemeClr val="tx1"/>
+                    </a:solidFill>
+                    <a:latin typeface="Arial" charset="0"/>
+                    <a:ea typeface="宋体" pitchFamily="2" charset="-122"/>
+                  </a:defRPr>
+                </a:lvl2pPr>
+                <a:lvl3pPr marL="1143000" indent="-228600" eaLnBrk="0" hangingPunct="0">
+                  <a:defRPr>
+                    <a:solidFill>
+                      <a:schemeClr val="tx1"/>
+                    </a:solidFill>
+                    <a:latin typeface="Arial" charset="0"/>
+                    <a:ea typeface="宋体" pitchFamily="2" charset="-122"/>
+                  </a:defRPr>
+                </a:lvl3pPr>
+                <a:lvl4pPr marL="1600200" indent="-228600" eaLnBrk="0" hangingPunct="0">
+                  <a:defRPr>
+                    <a:solidFill>
+                      <a:schemeClr val="tx1"/>
+                    </a:solidFill>
+                    <a:latin typeface="Arial" charset="0"/>
+                    <a:ea typeface="宋体" pitchFamily="2" charset="-122"/>
+                  </a:defRPr>
+                </a:lvl4pPr>
+                <a:lvl5pPr marL="2057400" indent="-228600" eaLnBrk="0" hangingPunct="0">
+                  <a:defRPr>
+                    <a:solidFill>
+                      <a:schemeClr val="tx1"/>
+                    </a:solidFill>
+                    <a:latin typeface="Arial" charset="0"/>
+                    <a:ea typeface="宋体" pitchFamily="2" charset="-122"/>
+                  </a:defRPr>
+                </a:lvl5pPr>
+                <a:lvl6pPr marL="2514600" indent="-228600" eaLnBrk="0" fontAlgn="base" hangingPunct="0">
+                  <a:spcBef>
+                    <a:spcPct val="0"/>
+                  </a:spcBef>
+                  <a:spcAft>
+                    <a:spcPct val="0"/>
+                  </a:spcAft>
+                  <a:defRPr>
+                    <a:solidFill>
+                      <a:schemeClr val="tx1"/>
+                    </a:solidFill>
+                    <a:latin typeface="Arial" charset="0"/>
+                    <a:ea typeface="宋体" pitchFamily="2" charset="-122"/>
+                  </a:defRPr>
+                </a:lvl6pPr>
+                <a:lvl7pPr marL="2971800" indent="-228600" eaLnBrk="0" fontAlgn="base" hangingPunct="0">
+                  <a:spcBef>
+                    <a:spcPct val="0"/>
+                  </a:spcBef>
+                  <a:spcAft>
+                    <a:spcPct val="0"/>
+                  </a:spcAft>
+                  <a:defRPr>
+                    <a:solidFill>
+                      <a:schemeClr val="tx1"/>
+                    </a:solidFill>
+                    <a:latin typeface="Arial" charset="0"/>
+                    <a:ea typeface="宋体" pitchFamily="2" charset="-122"/>
+                  </a:defRPr>
+                </a:lvl7pPr>
+                <a:lvl8pPr marL="3429000" indent="-228600" eaLnBrk="0" fontAlgn="base" hangingPunct="0">
+                  <a:spcBef>
+                    <a:spcPct val="0"/>
+                  </a:spcBef>
+                  <a:spcAft>
+                    <a:spcPct val="0"/>
+                  </a:spcAft>
+                  <a:defRPr>
+                    <a:solidFill>
+                      <a:schemeClr val="tx1"/>
+                    </a:solidFill>
+                    <a:latin typeface="Arial" charset="0"/>
+                    <a:ea typeface="宋体" pitchFamily="2" charset="-122"/>
+                  </a:defRPr>
+                </a:lvl8pPr>
+                <a:lvl9pPr marL="3886200" indent="-228600" eaLnBrk="0" fontAlgn="base" hangingPunct="0">
+                  <a:spcBef>
+                    <a:spcPct val="0"/>
+                  </a:spcBef>
+                  <a:spcAft>
+                    <a:spcPct val="0"/>
+                  </a:spcAft>
+                  <a:defRPr>
+                    <a:solidFill>
+                      <a:schemeClr val="tx1"/>
+                    </a:solidFill>
+                    <a:latin typeface="Arial" charset="0"/>
+                    <a:ea typeface="宋体" pitchFamily="2" charset="-122"/>
+                  </a:defRPr>
+                </a:lvl9pPr>
+              </a:lstStyle>
+              <a:p>
+                <a:pPr algn="ctr" eaLnBrk="1" hangingPunct="1"/>
+                <a:r>
+                  <a:rPr lang="en-US" altLang="zh-CN" sz="6600" b="1" dirty="0">
+                    <a:solidFill>
+                      <a:schemeClr val="bg1"/>
+                    </a:solidFill>
+                  </a:rPr>
+                  <a:t>1</a:t>
+                </a:r>
+                <a:endParaRPr lang="zh-CN" altLang="en-US" sz="6600" b="1" dirty="0">
+                  <a:solidFill>
+                    <a:schemeClr val="bg1"/>
+                  </a:solidFill>
+                </a:endParaRPr>
+              </a:p>
+            </p:txBody>
+          </p:sp>
+          <p:sp>
+            <p:nvSpPr>
+              <p:cNvPr id="34" name="TextBox 16"/>
+              <p:cNvSpPr txBox="1">
+                <a:spLocks noChangeArrowheads="1"/>
+              </p:cNvSpPr>
+              <p:nvPr/>
+            </p:nvSpPr>
+            <p:spPr bwMode="auto">
+              <a:xfrm>
+                <a:off x="-8047897" y="-6614020"/>
+                <a:ext cx="5157216" cy="1107996"/>
+              </a:xfrm>
+              <a:prstGeom prst="rect">
+                <a:avLst/>
+              </a:prstGeom>
+              <a:solidFill>
+                <a:schemeClr val="tx1"/>
+              </a:solidFill>
+              <a:ln>
+                <a:noFill/>
+              </a:ln>
+              <a:extLst/>
+            </p:spPr>
+            <p:txBody>
+              <a:bodyPr>
+                <a:spAutoFit/>
+              </a:bodyPr>
+              <a:lstStyle>
+                <a:lvl1pPr eaLnBrk="0" hangingPunct="0">
+                  <a:defRPr>
+                    <a:solidFill>
+                      <a:schemeClr val="tx1"/>
+                    </a:solidFill>
+                    <a:latin typeface="Arial" charset="0"/>
+                    <a:ea typeface="宋体" pitchFamily="2" charset="-122"/>
+                  </a:defRPr>
+                </a:lvl1pPr>
+                <a:lvl2pPr marL="742950" indent="-285750" eaLnBrk="0" hangingPunct="0">
+                  <a:defRPr>
+                    <a:solidFill>
+                      <a:schemeClr val="tx1"/>
+                    </a:solidFill>
+                    <a:latin typeface="Arial" charset="0"/>
+                    <a:ea typeface="宋体" pitchFamily="2" charset="-122"/>
+                  </a:defRPr>
+                </a:lvl2pPr>
+                <a:lvl3pPr marL="1143000" indent="-228600" eaLnBrk="0" hangingPunct="0">
+                  <a:defRPr>
+                    <a:solidFill>
+                      <a:schemeClr val="tx1"/>
+                    </a:solidFill>
+                    <a:latin typeface="Arial" charset="0"/>
+                    <a:ea typeface="宋体" pitchFamily="2" charset="-122"/>
+                  </a:defRPr>
+                </a:lvl3pPr>
+                <a:lvl4pPr marL="1600200" indent="-228600" eaLnBrk="0" hangingPunct="0">
+                  <a:defRPr>
+                    <a:solidFill>
+                      <a:schemeClr val="tx1"/>
+                    </a:solidFill>
+                    <a:latin typeface="Arial" charset="0"/>
+                    <a:ea typeface="宋体" pitchFamily="2" charset="-122"/>
+                  </a:defRPr>
+                </a:lvl4pPr>
+                <a:lvl5pPr marL="2057400" indent="-228600" eaLnBrk="0" hangingPunct="0">
+                  <a:defRPr>
+                    <a:solidFill>
+                      <a:schemeClr val="tx1"/>
+                    </a:solidFill>
+                    <a:latin typeface="Arial" charset="0"/>
+                    <a:ea typeface="宋体" pitchFamily="2" charset="-122"/>
+                  </a:defRPr>
+                </a:lvl5pPr>
+                <a:lvl6pPr marL="2514600" indent="-228600" eaLnBrk="0" fontAlgn="base" hangingPunct="0">
+                  <a:spcBef>
+                    <a:spcPct val="0"/>
+                  </a:spcBef>
+                  <a:spcAft>
+                    <a:spcPct val="0"/>
+                  </a:spcAft>
+                  <a:defRPr>
+                    <a:solidFill>
+                      <a:schemeClr val="tx1"/>
+                    </a:solidFill>
+                    <a:latin typeface="Arial" charset="0"/>
+                    <a:ea typeface="宋体" pitchFamily="2" charset="-122"/>
+                  </a:defRPr>
+                </a:lvl6pPr>
+                <a:lvl7pPr marL="2971800" indent="-228600" eaLnBrk="0" fontAlgn="base" hangingPunct="0">
+                  <a:spcBef>
+                    <a:spcPct val="0"/>
+                  </a:spcBef>
+                  <a:spcAft>
+                    <a:spcPct val="0"/>
+                  </a:spcAft>
+                  <a:defRPr>
+                    <a:solidFill>
+                      <a:schemeClr val="tx1"/>
+                    </a:solidFill>
+                    <a:latin typeface="Arial" charset="0"/>
+                    <a:ea typeface="宋体" pitchFamily="2" charset="-122"/>
+                  </a:defRPr>
+                </a:lvl7pPr>
+                <a:lvl8pPr marL="3429000" indent="-228600" eaLnBrk="0" fontAlgn="base" hangingPunct="0">
+                  <a:spcBef>
+                    <a:spcPct val="0"/>
+                  </a:spcBef>
+                  <a:spcAft>
+                    <a:spcPct val="0"/>
+                  </a:spcAft>
+                  <a:defRPr>
+                    <a:solidFill>
+                      <a:schemeClr val="tx1"/>
+                    </a:solidFill>
+                    <a:latin typeface="Arial" charset="0"/>
+                    <a:ea typeface="宋体" pitchFamily="2" charset="-122"/>
+                  </a:defRPr>
+                </a:lvl8pPr>
+                <a:lvl9pPr marL="3886200" indent="-228600" eaLnBrk="0" fontAlgn="base" hangingPunct="0">
+                  <a:spcBef>
+                    <a:spcPct val="0"/>
+                  </a:spcBef>
+                  <a:spcAft>
+                    <a:spcPct val="0"/>
+                  </a:spcAft>
+                  <a:defRPr>
+                    <a:solidFill>
+                      <a:schemeClr val="tx1"/>
+                    </a:solidFill>
+                    <a:latin typeface="Arial" charset="0"/>
+                    <a:ea typeface="宋体" pitchFamily="2" charset="-122"/>
+                  </a:defRPr>
+                </a:lvl9pPr>
+              </a:lstStyle>
+              <a:p>
+                <a:pPr eaLnBrk="1" hangingPunct="1"/>
+                <a:r>
+                  <a:rPr lang="en-US" altLang="zh-CN" sz="6000" b="1" dirty="0" smtClean="0">
+                    <a:solidFill>
+                      <a:schemeClr val="bg1"/>
+                    </a:solidFill>
+                  </a:rPr>
+                  <a:t>Power</a:t>
+                </a:r>
+                <a:r>
+                  <a:rPr lang="en-US" altLang="zh-CN" sz="6600" b="1" dirty="0" smtClean="0">
+                    <a:solidFill>
+                      <a:schemeClr val="bg1"/>
+                    </a:solidFill>
+                  </a:rPr>
+                  <a:t> </a:t>
+                </a:r>
+                <a:r>
+                  <a:rPr lang="en-US" altLang="zh-CN" sz="6000" b="1" dirty="0" smtClean="0">
+                    <a:solidFill>
+                      <a:schemeClr val="bg1"/>
+                    </a:solidFill>
+                  </a:rPr>
+                  <a:t> 0</a:t>
+                </a:r>
+                <a:endParaRPr lang="zh-CN" altLang="en-US" sz="6000" b="1" dirty="0">
+                  <a:solidFill>
+                    <a:schemeClr val="bg1"/>
+                  </a:solidFill>
+                </a:endParaRPr>
+              </a:p>
+            </p:txBody>
+          </p:sp>
+          <p:sp>
+            <p:nvSpPr>
+              <p:cNvPr id="35" name="TextBox 16"/>
+              <p:cNvSpPr txBox="1">
+                <a:spLocks noChangeArrowheads="1"/>
+              </p:cNvSpPr>
+              <p:nvPr/>
+            </p:nvSpPr>
+            <p:spPr bwMode="auto">
+              <a:xfrm>
+                <a:off x="2523413" y="-6614020"/>
+                <a:ext cx="5157216" cy="1107996"/>
+              </a:xfrm>
+              <a:prstGeom prst="rect">
+                <a:avLst/>
+              </a:prstGeom>
+              <a:solidFill>
+                <a:schemeClr val="tx1"/>
+              </a:solidFill>
+              <a:ln>
+                <a:noFill/>
+              </a:ln>
+              <a:extLst/>
+            </p:spPr>
+            <p:txBody>
+              <a:bodyPr>
+                <a:spAutoFit/>
+              </a:bodyPr>
+              <a:lstStyle>
+                <a:lvl1pPr eaLnBrk="0" hangingPunct="0">
+                  <a:defRPr>
+                    <a:solidFill>
+                      <a:schemeClr val="tx1"/>
+                    </a:solidFill>
+                    <a:latin typeface="Arial" charset="0"/>
+                    <a:ea typeface="宋体" pitchFamily="2" charset="-122"/>
+                  </a:defRPr>
+                </a:lvl1pPr>
+                <a:lvl2pPr marL="742950" indent="-285750" eaLnBrk="0" hangingPunct="0">
+                  <a:defRPr>
+                    <a:solidFill>
+                      <a:schemeClr val="tx1"/>
+                    </a:solidFill>
+                    <a:latin typeface="Arial" charset="0"/>
+                    <a:ea typeface="宋体" pitchFamily="2" charset="-122"/>
+                  </a:defRPr>
+                </a:lvl2pPr>
+                <a:lvl3pPr marL="1143000" indent="-228600" eaLnBrk="0" hangingPunct="0">
+                  <a:defRPr>
+                    <a:solidFill>
+                      <a:schemeClr val="tx1"/>
+                    </a:solidFill>
+                    <a:latin typeface="Arial" charset="0"/>
+                    <a:ea typeface="宋体" pitchFamily="2" charset="-122"/>
+                  </a:defRPr>
+                </a:lvl3pPr>
+                <a:lvl4pPr marL="1600200" indent="-228600" eaLnBrk="0" hangingPunct="0">
+                  <a:defRPr>
+                    <a:solidFill>
+                      <a:schemeClr val="tx1"/>
+                    </a:solidFill>
+                    <a:latin typeface="Arial" charset="0"/>
+                    <a:ea typeface="宋体" pitchFamily="2" charset="-122"/>
+                  </a:defRPr>
+                </a:lvl4pPr>
+                <a:lvl5pPr marL="2057400" indent="-228600" eaLnBrk="0" hangingPunct="0">
+                  <a:defRPr>
+                    <a:solidFill>
+                      <a:schemeClr val="tx1"/>
+                    </a:solidFill>
+                    <a:latin typeface="Arial" charset="0"/>
+                    <a:ea typeface="宋体" pitchFamily="2" charset="-122"/>
+                  </a:defRPr>
+                </a:lvl5pPr>
+                <a:lvl6pPr marL="2514600" indent="-228600" eaLnBrk="0" fontAlgn="base" hangingPunct="0">
+                  <a:spcBef>
+                    <a:spcPct val="0"/>
+                  </a:spcBef>
+                  <a:spcAft>
+                    <a:spcPct val="0"/>
+                  </a:spcAft>
+                  <a:defRPr>
+                    <a:solidFill>
+                      <a:schemeClr val="tx1"/>
+                    </a:solidFill>
+                    <a:latin typeface="Arial" charset="0"/>
+                    <a:ea typeface="宋体" pitchFamily="2" charset="-122"/>
+                  </a:defRPr>
+                </a:lvl6pPr>
+                <a:lvl7pPr marL="2971800" indent="-228600" eaLnBrk="0" fontAlgn="base" hangingPunct="0">
+                  <a:spcBef>
+                    <a:spcPct val="0"/>
+                  </a:spcBef>
+                  <a:spcAft>
+                    <a:spcPct val="0"/>
+                  </a:spcAft>
+                  <a:defRPr>
+                    <a:solidFill>
+                      <a:schemeClr val="tx1"/>
+                    </a:solidFill>
+                    <a:latin typeface="Arial" charset="0"/>
+                    <a:ea typeface="宋体" pitchFamily="2" charset="-122"/>
+                  </a:defRPr>
+                </a:lvl7pPr>
+                <a:lvl8pPr marL="3429000" indent="-228600" eaLnBrk="0" fontAlgn="base" hangingPunct="0">
+                  <a:spcBef>
+                    <a:spcPct val="0"/>
+                  </a:spcBef>
+                  <a:spcAft>
+                    <a:spcPct val="0"/>
+                  </a:spcAft>
+                  <a:defRPr>
+                    <a:solidFill>
+                      <a:schemeClr val="tx1"/>
+                    </a:solidFill>
+                    <a:latin typeface="Arial" charset="0"/>
+                    <a:ea typeface="宋体" pitchFamily="2" charset="-122"/>
+                  </a:defRPr>
+                </a:lvl8pPr>
+                <a:lvl9pPr marL="3886200" indent="-228600" eaLnBrk="0" fontAlgn="base" hangingPunct="0">
+                  <a:spcBef>
+                    <a:spcPct val="0"/>
+                  </a:spcBef>
+                  <a:spcAft>
+                    <a:spcPct val="0"/>
+                  </a:spcAft>
+                  <a:defRPr>
+                    <a:solidFill>
+                      <a:schemeClr val="tx1"/>
+                    </a:solidFill>
+                    <a:latin typeface="Arial" charset="0"/>
+                    <a:ea typeface="宋体" pitchFamily="2" charset="-122"/>
+                  </a:defRPr>
+                </a:lvl9pPr>
+              </a:lstStyle>
+              <a:p>
+                <a:pPr algn="ctr" eaLnBrk="1" hangingPunct="1"/>
+                <a:r>
+                  <a:rPr lang="en-US" altLang="zh-CN" sz="6600" b="1" dirty="0" smtClean="0">
+                    <a:solidFill>
+                      <a:schemeClr val="bg1"/>
+                    </a:solidFill>
+                  </a:rPr>
+                  <a:t>2</a:t>
+                </a:r>
+                <a:endParaRPr lang="zh-CN" altLang="en-US" sz="6600" b="1" dirty="0">
+                  <a:solidFill>
+                    <a:schemeClr val="bg1"/>
+                  </a:solidFill>
+                </a:endParaRPr>
+              </a:p>
+            </p:txBody>
+          </p:sp>
+          <p:sp>
+            <p:nvSpPr>
+              <p:cNvPr id="36" name="TextBox 16"/>
+              <p:cNvSpPr txBox="1">
+                <a:spLocks noChangeArrowheads="1"/>
+              </p:cNvSpPr>
+              <p:nvPr/>
+            </p:nvSpPr>
+            <p:spPr bwMode="auto">
+              <a:xfrm>
+                <a:off x="7809068" y="-6614020"/>
+                <a:ext cx="5157216" cy="1107996"/>
+              </a:xfrm>
+              <a:prstGeom prst="rect">
+                <a:avLst/>
+              </a:prstGeom>
+              <a:solidFill>
+                <a:schemeClr val="tx1"/>
+              </a:solidFill>
+              <a:ln>
+                <a:noFill/>
+              </a:ln>
+              <a:extLst/>
+            </p:spPr>
+            <p:txBody>
+              <a:bodyPr>
+                <a:spAutoFit/>
+              </a:bodyPr>
+              <a:lstStyle>
+                <a:lvl1pPr eaLnBrk="0" hangingPunct="0">
+                  <a:defRPr>
+                    <a:solidFill>
+                      <a:schemeClr val="tx1"/>
+                    </a:solidFill>
+                    <a:latin typeface="Arial" charset="0"/>
+                    <a:ea typeface="宋体" pitchFamily="2" charset="-122"/>
+                  </a:defRPr>
+                </a:lvl1pPr>
+                <a:lvl2pPr marL="742950" indent="-285750" eaLnBrk="0" hangingPunct="0">
+                  <a:defRPr>
+                    <a:solidFill>
+                      <a:schemeClr val="tx1"/>
+                    </a:solidFill>
+                    <a:latin typeface="Arial" charset="0"/>
+                    <a:ea typeface="宋体" pitchFamily="2" charset="-122"/>
+                  </a:defRPr>
+                </a:lvl2pPr>
+                <a:lvl3pPr marL="1143000" indent="-228600" eaLnBrk="0" hangingPunct="0">
+                  <a:defRPr>
+                    <a:solidFill>
+                      <a:schemeClr val="tx1"/>
+                    </a:solidFill>
+                    <a:latin typeface="Arial" charset="0"/>
+                    <a:ea typeface="宋体" pitchFamily="2" charset="-122"/>
+                  </a:defRPr>
+                </a:lvl3pPr>
+                <a:lvl4pPr marL="1600200" indent="-228600" eaLnBrk="0" hangingPunct="0">
+                  <a:defRPr>
+                    <a:solidFill>
+                      <a:schemeClr val="tx1"/>
+                    </a:solidFill>
+                    <a:latin typeface="Arial" charset="0"/>
+                    <a:ea typeface="宋体" pitchFamily="2" charset="-122"/>
+                  </a:defRPr>
+                </a:lvl4pPr>
+                <a:lvl5pPr marL="2057400" indent="-228600" eaLnBrk="0" hangingPunct="0">
+                  <a:defRPr>
+                    <a:solidFill>
+                      <a:schemeClr val="tx1"/>
+                    </a:solidFill>
+                    <a:latin typeface="Arial" charset="0"/>
+                    <a:ea typeface="宋体" pitchFamily="2" charset="-122"/>
+                  </a:defRPr>
+                </a:lvl5pPr>
+                <a:lvl6pPr marL="2514600" indent="-228600" eaLnBrk="0" fontAlgn="base" hangingPunct="0">
+                  <a:spcBef>
+                    <a:spcPct val="0"/>
+                  </a:spcBef>
+                  <a:spcAft>
+                    <a:spcPct val="0"/>
+                  </a:spcAft>
+                  <a:defRPr>
+                    <a:solidFill>
+                      <a:schemeClr val="tx1"/>
+                    </a:solidFill>
+                    <a:latin typeface="Arial" charset="0"/>
+                    <a:ea typeface="宋体" pitchFamily="2" charset="-122"/>
+                  </a:defRPr>
+                </a:lvl6pPr>
+                <a:lvl7pPr marL="2971800" indent="-228600" eaLnBrk="0" fontAlgn="base" hangingPunct="0">
+                  <a:spcBef>
+                    <a:spcPct val="0"/>
+                  </a:spcBef>
+                  <a:spcAft>
+                    <a:spcPct val="0"/>
+                  </a:spcAft>
+                  <a:defRPr>
+                    <a:solidFill>
+                      <a:schemeClr val="tx1"/>
+                    </a:solidFill>
+                    <a:latin typeface="Arial" charset="0"/>
+                    <a:ea typeface="宋体" pitchFamily="2" charset="-122"/>
+                  </a:defRPr>
+                </a:lvl7pPr>
+                <a:lvl8pPr marL="3429000" indent="-228600" eaLnBrk="0" fontAlgn="base" hangingPunct="0">
+                  <a:spcBef>
+                    <a:spcPct val="0"/>
+                  </a:spcBef>
+                  <a:spcAft>
+                    <a:spcPct val="0"/>
+                  </a:spcAft>
+                  <a:defRPr>
+                    <a:solidFill>
+                      <a:schemeClr val="tx1"/>
+                    </a:solidFill>
+                    <a:latin typeface="Arial" charset="0"/>
+                    <a:ea typeface="宋体" pitchFamily="2" charset="-122"/>
+                  </a:defRPr>
+                </a:lvl8pPr>
+                <a:lvl9pPr marL="3886200" indent="-228600" eaLnBrk="0" fontAlgn="base" hangingPunct="0">
+                  <a:spcBef>
+                    <a:spcPct val="0"/>
+                  </a:spcBef>
+                  <a:spcAft>
+                    <a:spcPct val="0"/>
+                  </a:spcAft>
+                  <a:defRPr>
+                    <a:solidFill>
+                      <a:schemeClr val="tx1"/>
+                    </a:solidFill>
+                    <a:latin typeface="Arial" charset="0"/>
+                    <a:ea typeface="宋体" pitchFamily="2" charset="-122"/>
+                  </a:defRPr>
+                </a:lvl9pPr>
+              </a:lstStyle>
+              <a:p>
+                <a:pPr algn="ctr" eaLnBrk="1" hangingPunct="1"/>
+                <a:r>
+                  <a:rPr lang="en-US" altLang="zh-CN" sz="6600" b="1" dirty="0" smtClean="0">
+                    <a:solidFill>
+                      <a:schemeClr val="bg1"/>
+                    </a:solidFill>
+                  </a:rPr>
+                  <a:t>4</a:t>
+                </a:r>
+                <a:endParaRPr lang="zh-CN" altLang="en-US" sz="6600" b="1" dirty="0">
+                  <a:solidFill>
+                    <a:schemeClr val="bg1"/>
+                  </a:solidFill>
+                </a:endParaRPr>
+              </a:p>
+            </p:txBody>
+          </p:sp>
+          <p:sp>
+            <p:nvSpPr>
+              <p:cNvPr id="37" name="TextBox 16"/>
+              <p:cNvSpPr txBox="1">
+                <a:spLocks noChangeArrowheads="1"/>
+              </p:cNvSpPr>
+              <p:nvPr/>
+            </p:nvSpPr>
+            <p:spPr bwMode="auto">
+              <a:xfrm>
+                <a:off x="13094725" y="-6614020"/>
+                <a:ext cx="5157216" cy="1107996"/>
+              </a:xfrm>
+              <a:prstGeom prst="rect">
+                <a:avLst/>
+              </a:prstGeom>
+              <a:solidFill>
+                <a:schemeClr val="tx1"/>
+              </a:solidFill>
+              <a:ln>
+                <a:noFill/>
+              </a:ln>
+              <a:extLst/>
+            </p:spPr>
+            <p:txBody>
+              <a:bodyPr>
+                <a:spAutoFit/>
+              </a:bodyPr>
+              <a:lstStyle>
+                <a:lvl1pPr eaLnBrk="0" hangingPunct="0">
+                  <a:defRPr>
+                    <a:solidFill>
+                      <a:schemeClr val="tx1"/>
+                    </a:solidFill>
+                    <a:latin typeface="Arial" charset="0"/>
+                    <a:ea typeface="宋体" pitchFamily="2" charset="-122"/>
+                  </a:defRPr>
+                </a:lvl1pPr>
+                <a:lvl2pPr marL="742950" indent="-285750" eaLnBrk="0" hangingPunct="0">
+                  <a:defRPr>
+                    <a:solidFill>
+                      <a:schemeClr val="tx1"/>
+                    </a:solidFill>
+                    <a:latin typeface="Arial" charset="0"/>
+                    <a:ea typeface="宋体" pitchFamily="2" charset="-122"/>
+                  </a:defRPr>
+                </a:lvl2pPr>
+                <a:lvl3pPr marL="1143000" indent="-228600" eaLnBrk="0" hangingPunct="0">
+                  <a:defRPr>
+                    <a:solidFill>
+                      <a:schemeClr val="tx1"/>
+                    </a:solidFill>
+                    <a:latin typeface="Arial" charset="0"/>
+                    <a:ea typeface="宋体" pitchFamily="2" charset="-122"/>
+                  </a:defRPr>
+                </a:lvl3pPr>
+                <a:lvl4pPr marL="1600200" indent="-228600" eaLnBrk="0" hangingPunct="0">
+                  <a:defRPr>
+                    <a:solidFill>
+                      <a:schemeClr val="tx1"/>
+                    </a:solidFill>
+                    <a:latin typeface="Arial" charset="0"/>
+                    <a:ea typeface="宋体" pitchFamily="2" charset="-122"/>
+                  </a:defRPr>
+                </a:lvl4pPr>
+                <a:lvl5pPr marL="2057400" indent="-228600" eaLnBrk="0" hangingPunct="0">
+                  <a:defRPr>
+                    <a:solidFill>
+                      <a:schemeClr val="tx1"/>
+                    </a:solidFill>
+                    <a:latin typeface="Arial" charset="0"/>
+                    <a:ea typeface="宋体" pitchFamily="2" charset="-122"/>
+                  </a:defRPr>
+                </a:lvl5pPr>
+                <a:lvl6pPr marL="2514600" indent="-228600" eaLnBrk="0" fontAlgn="base" hangingPunct="0">
+                  <a:spcBef>
+                    <a:spcPct val="0"/>
+                  </a:spcBef>
+                  <a:spcAft>
+                    <a:spcPct val="0"/>
+                  </a:spcAft>
+                  <a:defRPr>
+                    <a:solidFill>
+                      <a:schemeClr val="tx1"/>
+                    </a:solidFill>
+                    <a:latin typeface="Arial" charset="0"/>
+                    <a:ea typeface="宋体" pitchFamily="2" charset="-122"/>
+                  </a:defRPr>
+                </a:lvl6pPr>
+                <a:lvl7pPr marL="2971800" indent="-228600" eaLnBrk="0" fontAlgn="base" hangingPunct="0">
+                  <a:spcBef>
+                    <a:spcPct val="0"/>
+                  </a:spcBef>
+                  <a:spcAft>
+                    <a:spcPct val="0"/>
+                  </a:spcAft>
+                  <a:defRPr>
+                    <a:solidFill>
+                      <a:schemeClr val="tx1"/>
+                    </a:solidFill>
+                    <a:latin typeface="Arial" charset="0"/>
+                    <a:ea typeface="宋体" pitchFamily="2" charset="-122"/>
+                  </a:defRPr>
+                </a:lvl7pPr>
+                <a:lvl8pPr marL="3429000" indent="-228600" eaLnBrk="0" fontAlgn="base" hangingPunct="0">
+                  <a:spcBef>
+                    <a:spcPct val="0"/>
+                  </a:spcBef>
+                  <a:spcAft>
+                    <a:spcPct val="0"/>
+                  </a:spcAft>
+                  <a:defRPr>
+                    <a:solidFill>
+                      <a:schemeClr val="tx1"/>
+                    </a:solidFill>
+                    <a:latin typeface="Arial" charset="0"/>
+                    <a:ea typeface="宋体" pitchFamily="2" charset="-122"/>
+                  </a:defRPr>
+                </a:lvl8pPr>
+                <a:lvl9pPr marL="3886200" indent="-228600" eaLnBrk="0" fontAlgn="base" hangingPunct="0">
+                  <a:spcBef>
+                    <a:spcPct val="0"/>
+                  </a:spcBef>
+                  <a:spcAft>
+                    <a:spcPct val="0"/>
+                  </a:spcAft>
+                  <a:defRPr>
+                    <a:solidFill>
+                      <a:schemeClr val="tx1"/>
+                    </a:solidFill>
+                    <a:latin typeface="Arial" charset="0"/>
+                    <a:ea typeface="宋体" pitchFamily="2" charset="-122"/>
+                  </a:defRPr>
+                </a:lvl9pPr>
+              </a:lstStyle>
+              <a:p>
+                <a:pPr algn="ctr" eaLnBrk="1" hangingPunct="1"/>
+                <a:r>
+                  <a:rPr lang="en-US" altLang="zh-CN" sz="6600" b="1" dirty="0">
+                    <a:solidFill>
+                      <a:schemeClr val="bg1"/>
+                    </a:solidFill>
+                  </a:rPr>
+                  <a:t>8</a:t>
+                </a:r>
+                <a:endParaRPr lang="zh-CN" altLang="en-US" sz="6600" b="1" dirty="0">
+                  <a:solidFill>
+                    <a:schemeClr val="bg1"/>
+                  </a:solidFill>
+                </a:endParaRPr>
+              </a:p>
+            </p:txBody>
+          </p:sp>
+        </p:grpSp>
         <p:pic>
           <p:nvPicPr>
-            <p:cNvPr id="2050" name="图片 1"/>
+            <p:cNvPr id="39" name="图片 1"/>
             <p:cNvPicPr>
               <a:picLocks noChangeAspect="1"/>
             </p:cNvPicPr>
             <p:nvPr/>
           </p:nvPicPr>
           <p:blipFill>
-            <a:blip r:embed="rId2">
+            <a:blip r:embed="rId8">
               <a:extLst>
                 <a:ext uri="{28A0092B-C50C-407E-A947-70E740481C1C}">
                   <a14:useLocalDpi xmlns:a14="http://schemas.microsoft.com/office/drawing/2010/main" val="0"/>
                 </a:ext>
               </a:extLst>
             </a:blip>
-            <a:srcRect/>
             <a:stretch>
               <a:fillRect/>
             </a:stretch>
           </p:blipFill>
           <p:spPr bwMode="auto">
             <a:xfrm>
-              <a:off x="-7453313" y="115888"/>
-              <a:ext cx="5715000" cy="5715000"/>
+              <a:off x="-8047897" y="1758940"/>
+              <a:ext cx="5158795" cy="5714999"/>
             </a:xfrm>
             <a:prstGeom prst="rect">
               <a:avLst/>
@@ -3680,29 +5007,28 @@
         </p:pic>
         <p:pic>
           <p:nvPicPr>
-            <p:cNvPr id="2051" name="图片 2"/>
+            <p:cNvPr id="40" name="图片 2"/>
             <p:cNvPicPr>
               <a:picLocks noChangeAspect="1"/>
             </p:cNvPicPr>
             <p:nvPr/>
           </p:nvPicPr>
           <p:blipFill>
-            <a:blip r:embed="rId3">
+            <a:blip r:embed="rId9">
               <a:extLst>
                 <a:ext uri="{28A0092B-C50C-407E-A947-70E740481C1C}">
                   <a14:useLocalDpi xmlns:a14="http://schemas.microsoft.com/office/drawing/2010/main" val="0"/>
                 </a:ext>
               </a:extLst>
             </a:blip>
-            <a:srcRect/>
             <a:stretch>
               <a:fillRect/>
             </a:stretch>
           </p:blipFill>
           <p:spPr bwMode="auto">
             <a:xfrm>
-              <a:off x="-2700338" y="115888"/>
-              <a:ext cx="5715001" cy="5715000"/>
+              <a:off x="-2762242" y="1758940"/>
+              <a:ext cx="5158795" cy="5714999"/>
             </a:xfrm>
             <a:prstGeom prst="rect">
               <a:avLst/>
@@ -3734,29 +5060,28 @@
         </p:pic>
         <p:pic>
           <p:nvPicPr>
-            <p:cNvPr id="2052" name="图片 5"/>
+            <p:cNvPr id="41" name="图片 5"/>
             <p:cNvPicPr>
               <a:picLocks noChangeAspect="1"/>
             </p:cNvPicPr>
             <p:nvPr/>
           </p:nvPicPr>
           <p:blipFill>
-            <a:blip r:embed="rId4">
+            <a:blip r:embed="rId10">
               <a:extLst>
                 <a:ext uri="{28A0092B-C50C-407E-A947-70E740481C1C}">
                   <a14:useLocalDpi xmlns:a14="http://schemas.microsoft.com/office/drawing/2010/main" val="0"/>
                 </a:ext>
               </a:extLst>
             </a:blip>
-            <a:srcRect/>
             <a:stretch>
               <a:fillRect/>
             </a:stretch>
           </p:blipFill>
           <p:spPr bwMode="auto">
             <a:xfrm>
-              <a:off x="2051050" y="115888"/>
-              <a:ext cx="5715000" cy="5715000"/>
+              <a:off x="2523414" y="1758940"/>
+              <a:ext cx="5158795" cy="5714999"/>
             </a:xfrm>
             <a:prstGeom prst="rect">
               <a:avLst/>
@@ -3788,29 +5113,28 @@
         </p:pic>
         <p:pic>
           <p:nvPicPr>
-            <p:cNvPr id="2053" name="图片 6"/>
+            <p:cNvPr id="42" name="图片 6"/>
             <p:cNvPicPr>
               <a:picLocks noChangeAspect="1"/>
             </p:cNvPicPr>
             <p:nvPr/>
           </p:nvPicPr>
           <p:blipFill>
-            <a:blip r:embed="rId5">
+            <a:blip r:embed="rId11">
               <a:extLst>
                 <a:ext uri="{28A0092B-C50C-407E-A947-70E740481C1C}">
                   <a14:useLocalDpi xmlns:a14="http://schemas.microsoft.com/office/drawing/2010/main" val="0"/>
                 </a:ext>
               </a:extLst>
             </a:blip>
-            <a:srcRect/>
             <a:stretch>
               <a:fillRect/>
             </a:stretch>
           </p:blipFill>
           <p:spPr bwMode="auto">
             <a:xfrm>
-              <a:off x="6800850" y="115888"/>
-              <a:ext cx="5715000" cy="5715000"/>
+              <a:off x="7809070" y="1758940"/>
+              <a:ext cx="5158795" cy="5714999"/>
             </a:xfrm>
             <a:prstGeom prst="rect">
               <a:avLst/>
@@ -3840,613 +5164,9 @@
             </a:extLst>
           </p:spPr>
         </p:pic>
-        <p:pic>
-          <p:nvPicPr>
-            <p:cNvPr id="2054" name="图片 7"/>
-            <p:cNvPicPr>
-              <a:picLocks noChangeAspect="1"/>
-            </p:cNvPicPr>
-            <p:nvPr/>
-          </p:nvPicPr>
-          <p:blipFill>
-            <a:blip r:embed="rId6">
-              <a:extLst>
-                <a:ext uri="{28A0092B-C50C-407E-A947-70E740481C1C}">
-                  <a14:useLocalDpi xmlns:a14="http://schemas.microsoft.com/office/drawing/2010/main" val="0"/>
-                </a:ext>
-              </a:extLst>
-            </a:blip>
-            <a:srcRect/>
-            <a:stretch>
-              <a:fillRect/>
-            </a:stretch>
-          </p:blipFill>
-          <p:spPr bwMode="auto">
-            <a:xfrm>
-              <a:off x="11557000" y="115888"/>
-              <a:ext cx="5715000" cy="5715000"/>
-            </a:xfrm>
-            <a:prstGeom prst="rect">
-              <a:avLst/>
-            </a:prstGeom>
-            <a:noFill/>
-            <a:ln>
-              <a:noFill/>
-            </a:ln>
-            <a:extLst>
-              <a:ext uri="{909E8E84-426E-40DD-AFC4-6F175D3DCCD1}">
-                <a14:hiddenFill xmlns:a14="http://schemas.microsoft.com/office/drawing/2010/main">
-                  <a:solidFill>
-                    <a:srgbClr val="FFFFFF"/>
-                  </a:solidFill>
-                </a14:hiddenFill>
-              </a:ext>
-              <a:ext uri="{91240B29-F687-4F45-9708-019B960494DF}">
-                <a14:hiddenLine xmlns:a14="http://schemas.microsoft.com/office/drawing/2010/main" w="9525">
-                  <a:solidFill>
-                    <a:srgbClr val="000000"/>
-                  </a:solidFill>
-                  <a:miter lim="800000"/>
-                  <a:headEnd/>
-                  <a:tailEnd/>
-                </a14:hiddenLine>
-              </a:ext>
-            </a:extLst>
-          </p:spPr>
-        </p:pic>
-      </p:grpSp>
-      <p:pic>
-        <p:nvPicPr>
-          <p:cNvPr id="2055" name="图片 8"/>
-          <p:cNvPicPr>
-            <a:picLocks noChangeAspect="1"/>
-          </p:cNvPicPr>
-          <p:nvPr/>
-        </p:nvPicPr>
-        <p:blipFill>
-          <a:blip r:embed="rId7">
-            <a:extLst>
-              <a:ext uri="{28A0092B-C50C-407E-A947-70E740481C1C}">
-                <a14:useLocalDpi xmlns:a14="http://schemas.microsoft.com/office/drawing/2010/main" val="0"/>
-              </a:ext>
-            </a:extLst>
-          </a:blip>
-          <a:srcRect/>
-          <a:stretch>
-            <a:fillRect/>
-          </a:stretch>
-        </p:blipFill>
-        <p:spPr bwMode="auto">
-          <a:xfrm>
-            <a:off x="-8134351" y="-603448"/>
-            <a:ext cx="5715000" cy="5715000"/>
-          </a:xfrm>
-          <a:prstGeom prst="rect">
-            <a:avLst/>
-          </a:prstGeom>
-          <a:noFill/>
-          <a:ln>
-            <a:noFill/>
-          </a:ln>
-          <a:extLst>
-            <a:ext uri="{909E8E84-426E-40DD-AFC4-6F175D3DCCD1}">
-              <a14:hiddenFill xmlns:a14="http://schemas.microsoft.com/office/drawing/2010/main">
-                <a:solidFill>
-                  <a:srgbClr val="FFFFFF"/>
-                </a:solidFill>
-              </a14:hiddenFill>
-            </a:ext>
-            <a:ext uri="{91240B29-F687-4F45-9708-019B960494DF}">
-              <a14:hiddenLine xmlns:a14="http://schemas.microsoft.com/office/drawing/2010/main" w="9525">
-                <a:solidFill>
-                  <a:srgbClr val="000000"/>
-                </a:solidFill>
-                <a:miter lim="800000"/>
-                <a:headEnd/>
-                <a:tailEnd/>
-              </a14:hiddenLine>
-            </a:ext>
-          </a:extLst>
-        </p:spPr>
-      </p:pic>
-      <p:pic>
-        <p:nvPicPr>
-          <p:cNvPr id="2056" name="图片 9"/>
-          <p:cNvPicPr>
-            <a:picLocks noChangeAspect="1"/>
-          </p:cNvPicPr>
-          <p:nvPr/>
-        </p:nvPicPr>
-        <p:blipFill>
-          <a:blip r:embed="rId8">
-            <a:extLst>
-              <a:ext uri="{28A0092B-C50C-407E-A947-70E740481C1C}">
-                <a14:useLocalDpi xmlns:a14="http://schemas.microsoft.com/office/drawing/2010/main" val="0"/>
-              </a:ext>
-            </a:extLst>
-          </a:blip>
-          <a:srcRect/>
-          <a:stretch>
-            <a:fillRect/>
-          </a:stretch>
-        </p:blipFill>
-        <p:spPr bwMode="auto">
-          <a:xfrm>
-            <a:off x="-3381376" y="-603448"/>
-            <a:ext cx="5715001" cy="5715000"/>
-          </a:xfrm>
-          <a:prstGeom prst="rect">
-            <a:avLst/>
-          </a:prstGeom>
-          <a:noFill/>
-          <a:ln>
-            <a:noFill/>
-          </a:ln>
-          <a:extLst>
-            <a:ext uri="{909E8E84-426E-40DD-AFC4-6F175D3DCCD1}">
-              <a14:hiddenFill xmlns:a14="http://schemas.microsoft.com/office/drawing/2010/main">
-                <a:solidFill>
-                  <a:srgbClr val="FFFFFF"/>
-                </a:solidFill>
-              </a14:hiddenFill>
-            </a:ext>
-            <a:ext uri="{91240B29-F687-4F45-9708-019B960494DF}">
-              <a14:hiddenLine xmlns:a14="http://schemas.microsoft.com/office/drawing/2010/main" w="9525">
-                <a:solidFill>
-                  <a:srgbClr val="000000"/>
-                </a:solidFill>
-                <a:miter lim="800000"/>
-                <a:headEnd/>
-                <a:tailEnd/>
-              </a14:hiddenLine>
-            </a:ext>
-          </a:extLst>
-        </p:spPr>
-      </p:pic>
-      <p:pic>
-        <p:nvPicPr>
-          <p:cNvPr id="2057" name="图片 10"/>
-          <p:cNvPicPr>
-            <a:picLocks noChangeAspect="1"/>
-          </p:cNvPicPr>
-          <p:nvPr/>
-        </p:nvPicPr>
-        <p:blipFill>
-          <a:blip r:embed="rId9">
-            <a:extLst>
-              <a:ext uri="{28A0092B-C50C-407E-A947-70E740481C1C}">
-                <a14:useLocalDpi xmlns:a14="http://schemas.microsoft.com/office/drawing/2010/main" val="0"/>
-              </a:ext>
-            </a:extLst>
-          </a:blip>
-          <a:srcRect/>
-          <a:stretch>
-            <a:fillRect/>
-          </a:stretch>
-        </p:blipFill>
-        <p:spPr bwMode="auto">
-          <a:xfrm>
-            <a:off x="1370012" y="-603448"/>
-            <a:ext cx="5715000" cy="5715000"/>
-          </a:xfrm>
-          <a:prstGeom prst="rect">
-            <a:avLst/>
-          </a:prstGeom>
-          <a:noFill/>
-          <a:ln>
-            <a:noFill/>
-          </a:ln>
-          <a:extLst>
-            <a:ext uri="{909E8E84-426E-40DD-AFC4-6F175D3DCCD1}">
-              <a14:hiddenFill xmlns:a14="http://schemas.microsoft.com/office/drawing/2010/main">
-                <a:solidFill>
-                  <a:srgbClr val="FFFFFF"/>
-                </a:solidFill>
-              </a14:hiddenFill>
-            </a:ext>
-            <a:ext uri="{91240B29-F687-4F45-9708-019B960494DF}">
-              <a14:hiddenLine xmlns:a14="http://schemas.microsoft.com/office/drawing/2010/main" w="9525">
-                <a:solidFill>
-                  <a:srgbClr val="000000"/>
-                </a:solidFill>
-                <a:miter lim="800000"/>
-                <a:headEnd/>
-                <a:tailEnd/>
-              </a14:hiddenLine>
-            </a:ext>
-          </a:extLst>
-        </p:spPr>
-      </p:pic>
-      <p:pic>
-        <p:nvPicPr>
-          <p:cNvPr id="2058" name="图片 11"/>
-          <p:cNvPicPr>
-            <a:picLocks noChangeAspect="1"/>
-          </p:cNvPicPr>
-          <p:nvPr/>
-        </p:nvPicPr>
-        <p:blipFill>
-          <a:blip r:embed="rId10">
-            <a:extLst>
-              <a:ext uri="{28A0092B-C50C-407E-A947-70E740481C1C}">
-                <a14:useLocalDpi xmlns:a14="http://schemas.microsoft.com/office/drawing/2010/main" val="0"/>
-              </a:ext>
-            </a:extLst>
-          </a:blip>
-          <a:srcRect/>
-          <a:stretch>
-            <a:fillRect/>
-          </a:stretch>
-        </p:blipFill>
-        <p:spPr bwMode="auto">
-          <a:xfrm>
-            <a:off x="6119812" y="-603448"/>
-            <a:ext cx="5715000" cy="5715000"/>
-          </a:xfrm>
-          <a:prstGeom prst="rect">
-            <a:avLst/>
-          </a:prstGeom>
-          <a:noFill/>
-          <a:ln>
-            <a:noFill/>
-          </a:ln>
-          <a:extLst>
-            <a:ext uri="{909E8E84-426E-40DD-AFC4-6F175D3DCCD1}">
-              <a14:hiddenFill xmlns:a14="http://schemas.microsoft.com/office/drawing/2010/main">
-                <a:solidFill>
-                  <a:srgbClr val="FFFFFF"/>
-                </a:solidFill>
-              </a14:hiddenFill>
-            </a:ext>
-            <a:ext uri="{91240B29-F687-4F45-9708-019B960494DF}">
-              <a14:hiddenLine xmlns:a14="http://schemas.microsoft.com/office/drawing/2010/main" w="9525">
-                <a:solidFill>
-                  <a:srgbClr val="000000"/>
-                </a:solidFill>
-                <a:miter lim="800000"/>
-                <a:headEnd/>
-                <a:tailEnd/>
-              </a14:hiddenLine>
-            </a:ext>
-          </a:extLst>
-        </p:spPr>
-      </p:pic>
-      <p:pic>
-        <p:nvPicPr>
-          <p:cNvPr id="2059" name="图片 12"/>
-          <p:cNvPicPr>
-            <a:picLocks noChangeAspect="1"/>
-          </p:cNvPicPr>
-          <p:nvPr/>
-        </p:nvPicPr>
-        <p:blipFill>
-          <a:blip r:embed="rId11">
-            <a:extLst>
-              <a:ext uri="{28A0092B-C50C-407E-A947-70E740481C1C}">
-                <a14:useLocalDpi xmlns:a14="http://schemas.microsoft.com/office/drawing/2010/main" val="0"/>
-              </a:ext>
-            </a:extLst>
-          </a:blip>
-          <a:srcRect/>
-          <a:stretch>
-            <a:fillRect/>
-          </a:stretch>
-        </p:blipFill>
-        <p:spPr bwMode="auto">
-          <a:xfrm>
-            <a:off x="10875962" y="-603448"/>
-            <a:ext cx="5715000" cy="5715000"/>
-          </a:xfrm>
-          <a:prstGeom prst="rect">
-            <a:avLst/>
-          </a:prstGeom>
-          <a:noFill/>
-          <a:ln>
-            <a:noFill/>
-          </a:ln>
-          <a:extLst>
-            <a:ext uri="{909E8E84-426E-40DD-AFC4-6F175D3DCCD1}">
-              <a14:hiddenFill xmlns:a14="http://schemas.microsoft.com/office/drawing/2010/main">
-                <a:solidFill>
-                  <a:srgbClr val="FFFFFF"/>
-                </a:solidFill>
-              </a14:hiddenFill>
-            </a:ext>
-            <a:ext uri="{91240B29-F687-4F45-9708-019B960494DF}">
-              <a14:hiddenLine xmlns:a14="http://schemas.microsoft.com/office/drawing/2010/main" w="9525">
-                <a:solidFill>
-                  <a:srgbClr val="000000"/>
-                </a:solidFill>
-                <a:miter lim="800000"/>
-                <a:headEnd/>
-                <a:tailEnd/>
-              </a14:hiddenLine>
-            </a:ext>
-          </a:extLst>
-        </p:spPr>
-      </p:pic>
-      <p:pic>
-        <p:nvPicPr>
-          <p:cNvPr id="20" name="图片 8"/>
-          <p:cNvPicPr>
-            <a:picLocks noChangeAspect="1"/>
-          </p:cNvPicPr>
-          <p:nvPr/>
-        </p:nvPicPr>
-        <p:blipFill>
-          <a:blip r:embed="rId12">
-            <a:extLst>
-              <a:ext uri="{28A0092B-C50C-407E-A947-70E740481C1C}">
-                <a14:useLocalDpi xmlns:a14="http://schemas.microsoft.com/office/drawing/2010/main" val="0"/>
-              </a:ext>
-            </a:extLst>
-          </a:blip>
-          <a:stretch>
-            <a:fillRect/>
-          </a:stretch>
-        </p:blipFill>
-        <p:spPr bwMode="auto">
-          <a:xfrm>
-            <a:off x="-8134351" y="4653136"/>
-            <a:ext cx="5715000" cy="5715000"/>
-          </a:xfrm>
-          <a:prstGeom prst="rect">
-            <a:avLst/>
-          </a:prstGeom>
-          <a:noFill/>
-          <a:ln>
-            <a:noFill/>
-          </a:ln>
-          <a:extLst>
-            <a:ext uri="{909E8E84-426E-40DD-AFC4-6F175D3DCCD1}">
-              <a14:hiddenFill xmlns:a14="http://schemas.microsoft.com/office/drawing/2010/main">
-                <a:solidFill>
-                  <a:srgbClr val="FFFFFF"/>
-                </a:solidFill>
-              </a14:hiddenFill>
-            </a:ext>
-            <a:ext uri="{91240B29-F687-4F45-9708-019B960494DF}">
-              <a14:hiddenLine xmlns:a14="http://schemas.microsoft.com/office/drawing/2010/main" w="9525">
-                <a:solidFill>
-                  <a:srgbClr val="000000"/>
-                </a:solidFill>
-                <a:miter lim="800000"/>
-                <a:headEnd/>
-                <a:tailEnd/>
-              </a14:hiddenLine>
-            </a:ext>
-          </a:extLst>
-        </p:spPr>
-      </p:pic>
-      <p:pic>
-        <p:nvPicPr>
-          <p:cNvPr id="21" name="图片 9"/>
-          <p:cNvPicPr>
-            <a:picLocks noChangeAspect="1"/>
-          </p:cNvPicPr>
-          <p:nvPr/>
-        </p:nvPicPr>
-        <p:blipFill>
-          <a:blip r:embed="rId13">
-            <a:extLst>
-              <a:ext uri="{28A0092B-C50C-407E-A947-70E740481C1C}">
-                <a14:useLocalDpi xmlns:a14="http://schemas.microsoft.com/office/drawing/2010/main" val="0"/>
-              </a:ext>
-            </a:extLst>
-          </a:blip>
-          <a:stretch>
-            <a:fillRect/>
-          </a:stretch>
-        </p:blipFill>
-        <p:spPr bwMode="auto">
-          <a:xfrm>
-            <a:off x="-3381376" y="4653136"/>
-            <a:ext cx="5715000" cy="5715000"/>
-          </a:xfrm>
-          <a:prstGeom prst="rect">
-            <a:avLst/>
-          </a:prstGeom>
-          <a:noFill/>
-          <a:ln>
-            <a:noFill/>
-          </a:ln>
-          <a:extLst>
-            <a:ext uri="{909E8E84-426E-40DD-AFC4-6F175D3DCCD1}">
-              <a14:hiddenFill xmlns:a14="http://schemas.microsoft.com/office/drawing/2010/main">
-                <a:solidFill>
-                  <a:srgbClr val="FFFFFF"/>
-                </a:solidFill>
-              </a14:hiddenFill>
-            </a:ext>
-            <a:ext uri="{91240B29-F687-4F45-9708-019B960494DF}">
-              <a14:hiddenLine xmlns:a14="http://schemas.microsoft.com/office/drawing/2010/main" w="9525">
-                <a:solidFill>
-                  <a:srgbClr val="000000"/>
-                </a:solidFill>
-                <a:miter lim="800000"/>
-                <a:headEnd/>
-                <a:tailEnd/>
-              </a14:hiddenLine>
-            </a:ext>
-          </a:extLst>
-        </p:spPr>
-      </p:pic>
-      <p:pic>
-        <p:nvPicPr>
-          <p:cNvPr id="22" name="图片 10"/>
-          <p:cNvPicPr>
-            <a:picLocks noChangeAspect="1"/>
-          </p:cNvPicPr>
-          <p:nvPr/>
-        </p:nvPicPr>
-        <p:blipFill>
-          <a:blip r:embed="rId14">
-            <a:extLst>
-              <a:ext uri="{28A0092B-C50C-407E-A947-70E740481C1C}">
-                <a14:useLocalDpi xmlns:a14="http://schemas.microsoft.com/office/drawing/2010/main" val="0"/>
-              </a:ext>
-            </a:extLst>
-          </a:blip>
-          <a:stretch>
-            <a:fillRect/>
-          </a:stretch>
-        </p:blipFill>
-        <p:spPr bwMode="auto">
-          <a:xfrm>
-            <a:off x="1370012" y="4653136"/>
-            <a:ext cx="5715000" cy="5715000"/>
-          </a:xfrm>
-          <a:prstGeom prst="rect">
-            <a:avLst/>
-          </a:prstGeom>
-          <a:noFill/>
-          <a:ln>
-            <a:noFill/>
-          </a:ln>
-          <a:extLst>
-            <a:ext uri="{909E8E84-426E-40DD-AFC4-6F175D3DCCD1}">
-              <a14:hiddenFill xmlns:a14="http://schemas.microsoft.com/office/drawing/2010/main">
-                <a:solidFill>
-                  <a:srgbClr val="FFFFFF"/>
-                </a:solidFill>
-              </a14:hiddenFill>
-            </a:ext>
-            <a:ext uri="{91240B29-F687-4F45-9708-019B960494DF}">
-              <a14:hiddenLine xmlns:a14="http://schemas.microsoft.com/office/drawing/2010/main" w="9525">
-                <a:solidFill>
-                  <a:srgbClr val="000000"/>
-                </a:solidFill>
-                <a:miter lim="800000"/>
-                <a:headEnd/>
-                <a:tailEnd/>
-              </a14:hiddenLine>
-            </a:ext>
-          </a:extLst>
-        </p:spPr>
-      </p:pic>
-      <p:pic>
-        <p:nvPicPr>
-          <p:cNvPr id="23" name="图片 11"/>
-          <p:cNvPicPr>
-            <a:picLocks noChangeAspect="1"/>
-          </p:cNvPicPr>
-          <p:nvPr/>
-        </p:nvPicPr>
-        <p:blipFill>
-          <a:blip r:embed="rId15">
-            <a:extLst>
-              <a:ext uri="{28A0092B-C50C-407E-A947-70E740481C1C}">
-                <a14:useLocalDpi xmlns:a14="http://schemas.microsoft.com/office/drawing/2010/main" val="0"/>
-              </a:ext>
-            </a:extLst>
-          </a:blip>
-          <a:stretch>
-            <a:fillRect/>
-          </a:stretch>
-        </p:blipFill>
-        <p:spPr bwMode="auto">
-          <a:xfrm>
-            <a:off x="6119812" y="4653136"/>
-            <a:ext cx="5715000" cy="5715000"/>
-          </a:xfrm>
-          <a:prstGeom prst="rect">
-            <a:avLst/>
-          </a:prstGeom>
-          <a:noFill/>
-          <a:ln>
-            <a:noFill/>
-          </a:ln>
-          <a:extLst>
-            <a:ext uri="{909E8E84-426E-40DD-AFC4-6F175D3DCCD1}">
-              <a14:hiddenFill xmlns:a14="http://schemas.microsoft.com/office/drawing/2010/main">
-                <a:solidFill>
-                  <a:srgbClr val="FFFFFF"/>
-                </a:solidFill>
-              </a14:hiddenFill>
-            </a:ext>
-            <a:ext uri="{91240B29-F687-4F45-9708-019B960494DF}">
-              <a14:hiddenLine xmlns:a14="http://schemas.microsoft.com/office/drawing/2010/main" w="9525">
-                <a:solidFill>
-                  <a:srgbClr val="000000"/>
-                </a:solidFill>
-                <a:miter lim="800000"/>
-                <a:headEnd/>
-                <a:tailEnd/>
-              </a14:hiddenLine>
-            </a:ext>
-          </a:extLst>
-        </p:spPr>
-      </p:pic>
-      <p:pic>
-        <p:nvPicPr>
-          <p:cNvPr id="24" name="图片 12"/>
-          <p:cNvPicPr>
-            <a:picLocks noChangeAspect="1"/>
-          </p:cNvPicPr>
-          <p:nvPr/>
-        </p:nvPicPr>
-        <p:blipFill>
-          <a:blip r:embed="rId16">
-            <a:extLst>
-              <a:ext uri="{28A0092B-C50C-407E-A947-70E740481C1C}">
-                <a14:useLocalDpi xmlns:a14="http://schemas.microsoft.com/office/drawing/2010/main" val="0"/>
-              </a:ext>
-            </a:extLst>
-          </a:blip>
-          <a:stretch>
-            <a:fillRect/>
-          </a:stretch>
-        </p:blipFill>
-        <p:spPr bwMode="auto">
-          <a:xfrm>
-            <a:off x="10875962" y="4653136"/>
-            <a:ext cx="5715000" cy="5715000"/>
-          </a:xfrm>
-          <a:prstGeom prst="rect">
-            <a:avLst/>
-          </a:prstGeom>
-          <a:noFill/>
-          <a:ln>
-            <a:noFill/>
-          </a:ln>
-          <a:extLst>
-            <a:ext uri="{909E8E84-426E-40DD-AFC4-6F175D3DCCD1}">
-              <a14:hiddenFill xmlns:a14="http://schemas.microsoft.com/office/drawing/2010/main">
-                <a:solidFill>
-                  <a:srgbClr val="FFFFFF"/>
-                </a:solidFill>
-              </a14:hiddenFill>
-            </a:ext>
-            <a:ext uri="{91240B29-F687-4F45-9708-019B960494DF}">
-              <a14:hiddenLine xmlns:a14="http://schemas.microsoft.com/office/drawing/2010/main" w="9525">
-                <a:solidFill>
-                  <a:srgbClr val="000000"/>
-                </a:solidFill>
-                <a:miter lim="800000"/>
-                <a:headEnd/>
-                <a:tailEnd/>
-              </a14:hiddenLine>
-            </a:ext>
-          </a:extLst>
-        </p:spPr>
-      </p:pic>
-      <p:grpSp>
-        <p:nvGrpSpPr>
-          <p:cNvPr id="4" name="组合 3"/>
-          <p:cNvGrpSpPr/>
-          <p:nvPr/>
-        </p:nvGrpSpPr>
-        <p:grpSpPr>
-          <a:xfrm>
-            <a:off x="-8134351" y="-5355976"/>
-            <a:ext cx="22204363" cy="1016000"/>
-            <a:chOff x="-7453313" y="9390063"/>
-            <a:chExt cx="22204363" cy="1016000"/>
-          </a:xfrm>
-        </p:grpSpPr>
         <p:sp>
           <p:nvSpPr>
-            <p:cNvPr id="2060" name="TextBox 13"/>
+            <p:cNvPr id="43" name="TextBox 17"/>
             <p:cNvSpPr txBox="1">
               <a:spLocks noChangeArrowheads="1"/>
             </p:cNvSpPr>
@@ -4454,8 +5174,8 @@
           </p:nvSpPr>
           <p:spPr bwMode="auto">
             <a:xfrm>
-              <a:off x="-4932363" y="9390063"/>
-              <a:ext cx="673100" cy="1016000"/>
+              <a:off x="-8047897" y="7331307"/>
+              <a:ext cx="26282920" cy="1323439"/>
             </a:xfrm>
             <a:prstGeom prst="rect">
               <a:avLst/>
@@ -4485,7 +5205,7 @@
             </a:extLst>
           </p:spPr>
           <p:txBody>
-            <a:bodyPr>
+            <a:bodyPr wrap="square">
               <a:spAutoFit/>
             </a:bodyPr>
             <a:lstStyle>
@@ -4598,24 +5318,281 @@
             <a:p>
               <a:pPr algn="ctr" eaLnBrk="1" hangingPunct="1"/>
               <a:r>
-                <a:rPr lang="en-US" altLang="zh-CN" sz="6000" b="1">
-                  <a:solidFill>
-                    <a:schemeClr val="bg1"/>
-                  </a:solidFill>
-                </a:rPr>
-                <a:t>0</a:t>
+                <a:rPr lang="en-US" altLang="zh-CN" sz="8000" b="1" dirty="0"/>
+                <a:t>(b) DSI-11-Gmax225 In Vivo</a:t>
               </a:r>
-              <a:endParaRPr lang="zh-CN" altLang="en-US" sz="6000" b="1">
-                <a:solidFill>
-                  <a:schemeClr val="bg1"/>
-                </a:solidFill>
-              </a:endParaRPr>
+              <a:endParaRPr lang="zh-CN" altLang="en-US" sz="8000" b="1" dirty="0"/>
             </a:p>
           </p:txBody>
         </p:sp>
+        <p:pic>
+          <p:nvPicPr>
+            <p:cNvPr id="44" name="图片 7"/>
+            <p:cNvPicPr>
+              <a:picLocks noChangeAspect="1"/>
+            </p:cNvPicPr>
+            <p:nvPr/>
+          </p:nvPicPr>
+          <p:blipFill>
+            <a:blip r:embed="rId12">
+              <a:extLst>
+                <a:ext uri="{28A0092B-C50C-407E-A947-70E740481C1C}">
+                  <a14:useLocalDpi xmlns:a14="http://schemas.microsoft.com/office/drawing/2010/main" val="0"/>
+                </a:ext>
+              </a:extLst>
+            </a:blip>
+            <a:stretch>
+              <a:fillRect/>
+            </a:stretch>
+          </p:blipFill>
+          <p:spPr bwMode="auto">
+            <a:xfrm>
+              <a:off x="13094725" y="1758941"/>
+              <a:ext cx="5158794" cy="5714999"/>
+            </a:xfrm>
+            <a:prstGeom prst="rect">
+              <a:avLst/>
+            </a:prstGeom>
+            <a:noFill/>
+            <a:ln>
+              <a:noFill/>
+            </a:ln>
+            <a:extLst>
+              <a:ext uri="{909E8E84-426E-40DD-AFC4-6F175D3DCCD1}">
+                <a14:hiddenFill xmlns:a14="http://schemas.microsoft.com/office/drawing/2010/main">
+                  <a:solidFill>
+                    <a:srgbClr val="FFFFFF"/>
+                  </a:solidFill>
+                </a14:hiddenFill>
+              </a:ext>
+              <a:ext uri="{91240B29-F687-4F45-9708-019B960494DF}">
+                <a14:hiddenLine xmlns:a14="http://schemas.microsoft.com/office/drawing/2010/main" w="9525">
+                  <a:solidFill>
+                    <a:srgbClr val="000000"/>
+                  </a:solidFill>
+                  <a:miter lim="800000"/>
+                  <a:headEnd/>
+                  <a:tailEnd/>
+                </a14:hiddenLine>
+              </a:ext>
+            </a:extLst>
+          </p:spPr>
+        </p:pic>
+        <p:pic>
+          <p:nvPicPr>
+            <p:cNvPr id="46" name="图片 1"/>
+            <p:cNvPicPr>
+              <a:picLocks noChangeAspect="1"/>
+            </p:cNvPicPr>
+            <p:nvPr/>
+          </p:nvPicPr>
+          <p:blipFill>
+            <a:blip r:embed="rId13">
+              <a:extLst>
+                <a:ext uri="{28A0092B-C50C-407E-A947-70E740481C1C}">
+                  <a14:useLocalDpi xmlns:a14="http://schemas.microsoft.com/office/drawing/2010/main" val="0"/>
+                </a:ext>
+              </a:extLst>
+            </a:blip>
+            <a:stretch>
+              <a:fillRect/>
+            </a:stretch>
+          </p:blipFill>
+          <p:spPr bwMode="auto">
+            <a:xfrm>
+              <a:off x="-8047897" y="8973616"/>
+              <a:ext cx="5158795" cy="5714999"/>
+            </a:xfrm>
+            <a:prstGeom prst="rect">
+              <a:avLst/>
+            </a:prstGeom>
+            <a:noFill/>
+            <a:ln>
+              <a:noFill/>
+            </a:ln>
+            <a:extLst>
+              <a:ext uri="{909E8E84-426E-40DD-AFC4-6F175D3DCCD1}">
+                <a14:hiddenFill xmlns:a14="http://schemas.microsoft.com/office/drawing/2010/main">
+                  <a:solidFill>
+                    <a:srgbClr val="FFFFFF"/>
+                  </a:solidFill>
+                </a14:hiddenFill>
+              </a:ext>
+              <a:ext uri="{91240B29-F687-4F45-9708-019B960494DF}">
+                <a14:hiddenLine xmlns:a14="http://schemas.microsoft.com/office/drawing/2010/main" w="9525">
+                  <a:solidFill>
+                    <a:srgbClr val="000000"/>
+                  </a:solidFill>
+                  <a:miter lim="800000"/>
+                  <a:headEnd/>
+                  <a:tailEnd/>
+                </a14:hiddenLine>
+              </a:ext>
+            </a:extLst>
+          </p:spPr>
+        </p:pic>
+        <p:pic>
+          <p:nvPicPr>
+            <p:cNvPr id="47" name="图片 2"/>
+            <p:cNvPicPr>
+              <a:picLocks noChangeAspect="1"/>
+            </p:cNvPicPr>
+            <p:nvPr/>
+          </p:nvPicPr>
+          <p:blipFill>
+            <a:blip r:embed="rId14">
+              <a:extLst>
+                <a:ext uri="{28A0092B-C50C-407E-A947-70E740481C1C}">
+                  <a14:useLocalDpi xmlns:a14="http://schemas.microsoft.com/office/drawing/2010/main" val="0"/>
+                </a:ext>
+              </a:extLst>
+            </a:blip>
+            <a:stretch>
+              <a:fillRect/>
+            </a:stretch>
+          </p:blipFill>
+          <p:spPr bwMode="auto">
+            <a:xfrm>
+              <a:off x="-2762242" y="8973616"/>
+              <a:ext cx="5158795" cy="5714999"/>
+            </a:xfrm>
+            <a:prstGeom prst="rect">
+              <a:avLst/>
+            </a:prstGeom>
+            <a:noFill/>
+            <a:ln>
+              <a:noFill/>
+            </a:ln>
+            <a:extLst>
+              <a:ext uri="{909E8E84-426E-40DD-AFC4-6F175D3DCCD1}">
+                <a14:hiddenFill xmlns:a14="http://schemas.microsoft.com/office/drawing/2010/main">
+                  <a:solidFill>
+                    <a:srgbClr val="FFFFFF"/>
+                  </a:solidFill>
+                </a14:hiddenFill>
+              </a:ext>
+              <a:ext uri="{91240B29-F687-4F45-9708-019B960494DF}">
+                <a14:hiddenLine xmlns:a14="http://schemas.microsoft.com/office/drawing/2010/main" w="9525">
+                  <a:solidFill>
+                    <a:srgbClr val="000000"/>
+                  </a:solidFill>
+                  <a:miter lim="800000"/>
+                  <a:headEnd/>
+                  <a:tailEnd/>
+                </a14:hiddenLine>
+              </a:ext>
+            </a:extLst>
+          </p:spPr>
+        </p:pic>
+        <p:pic>
+          <p:nvPicPr>
+            <p:cNvPr id="48" name="图片 5"/>
+            <p:cNvPicPr>
+              <a:picLocks noChangeAspect="1"/>
+            </p:cNvPicPr>
+            <p:nvPr/>
+          </p:nvPicPr>
+          <p:blipFill>
+            <a:blip r:embed="rId15">
+              <a:extLst>
+                <a:ext uri="{28A0092B-C50C-407E-A947-70E740481C1C}">
+                  <a14:useLocalDpi xmlns:a14="http://schemas.microsoft.com/office/drawing/2010/main" val="0"/>
+                </a:ext>
+              </a:extLst>
+            </a:blip>
+            <a:stretch>
+              <a:fillRect/>
+            </a:stretch>
+          </p:blipFill>
+          <p:spPr bwMode="auto">
+            <a:xfrm>
+              <a:off x="2523414" y="8973616"/>
+              <a:ext cx="5158795" cy="5714999"/>
+            </a:xfrm>
+            <a:prstGeom prst="rect">
+              <a:avLst/>
+            </a:prstGeom>
+            <a:noFill/>
+            <a:ln>
+              <a:noFill/>
+            </a:ln>
+            <a:extLst>
+              <a:ext uri="{909E8E84-426E-40DD-AFC4-6F175D3DCCD1}">
+                <a14:hiddenFill xmlns:a14="http://schemas.microsoft.com/office/drawing/2010/main">
+                  <a:solidFill>
+                    <a:srgbClr val="FFFFFF"/>
+                  </a:solidFill>
+                </a14:hiddenFill>
+              </a:ext>
+              <a:ext uri="{91240B29-F687-4F45-9708-019B960494DF}">
+                <a14:hiddenLine xmlns:a14="http://schemas.microsoft.com/office/drawing/2010/main" w="9525">
+                  <a:solidFill>
+                    <a:srgbClr val="000000"/>
+                  </a:solidFill>
+                  <a:miter lim="800000"/>
+                  <a:headEnd/>
+                  <a:tailEnd/>
+                </a14:hiddenLine>
+              </a:ext>
+            </a:extLst>
+          </p:spPr>
+        </p:pic>
+        <p:pic>
+          <p:nvPicPr>
+            <p:cNvPr id="49" name="图片 6"/>
+            <p:cNvPicPr>
+              <a:picLocks noChangeAspect="1"/>
+            </p:cNvPicPr>
+            <p:nvPr/>
+          </p:nvPicPr>
+          <p:blipFill>
+            <a:blip r:embed="rId16">
+              <a:extLst>
+                <a:ext uri="{28A0092B-C50C-407E-A947-70E740481C1C}">
+                  <a14:useLocalDpi xmlns:a14="http://schemas.microsoft.com/office/drawing/2010/main" val="0"/>
+                </a:ext>
+              </a:extLst>
+            </a:blip>
+            <a:stretch>
+              <a:fillRect/>
+            </a:stretch>
+          </p:blipFill>
+          <p:spPr bwMode="auto">
+            <a:xfrm>
+              <a:off x="7809070" y="8973616"/>
+              <a:ext cx="5158795" cy="5714999"/>
+            </a:xfrm>
+            <a:prstGeom prst="rect">
+              <a:avLst/>
+            </a:prstGeom>
+            <a:noFill/>
+            <a:ln>
+              <a:noFill/>
+            </a:ln>
+            <a:extLst>
+              <a:ext uri="{909E8E84-426E-40DD-AFC4-6F175D3DCCD1}">
+                <a14:hiddenFill xmlns:a14="http://schemas.microsoft.com/office/drawing/2010/main">
+                  <a:solidFill>
+                    <a:srgbClr val="FFFFFF"/>
+                  </a:solidFill>
+                </a14:hiddenFill>
+              </a:ext>
+              <a:ext uri="{91240B29-F687-4F45-9708-019B960494DF}">
+                <a14:hiddenLine xmlns:a14="http://schemas.microsoft.com/office/drawing/2010/main" w="9525">
+                  <a:solidFill>
+                    <a:srgbClr val="000000"/>
+                  </a:solidFill>
+                  <a:miter lim="800000"/>
+                  <a:headEnd/>
+                  <a:tailEnd/>
+                </a14:hiddenLine>
+              </a:ext>
+            </a:extLst>
+          </p:spPr>
+        </p:pic>
         <p:sp>
           <p:nvSpPr>
-            <p:cNvPr id="2061" name="TextBox 16"/>
+            <p:cNvPr id="50" name="TextBox 17"/>
             <p:cNvSpPr txBox="1">
               <a:spLocks noChangeArrowheads="1"/>
             </p:cNvSpPr>
@@ -4623,8 +5600,8 @@
           </p:nvSpPr>
           <p:spPr bwMode="auto">
             <a:xfrm>
-              <a:off x="-179388" y="9390063"/>
-              <a:ext cx="673101" cy="1016000"/>
+              <a:off x="-8047897" y="14518232"/>
+              <a:ext cx="26282920" cy="1323439"/>
             </a:xfrm>
             <a:prstGeom prst="rect">
               <a:avLst/>
@@ -4654,7 +5631,7 @@
             </a:extLst>
           </p:spPr>
           <p:txBody>
-            <a:bodyPr>
+            <a:bodyPr wrap="square">
               <a:spAutoFit/>
             </a:bodyPr>
             <a:lstStyle>
@@ -4767,33 +5744,37 @@
             <a:p>
               <a:pPr algn="ctr" eaLnBrk="1" hangingPunct="1"/>
               <a:r>
-                <a:rPr lang="en-US" altLang="zh-CN" sz="6000" b="1">
-                  <a:solidFill>
-                    <a:schemeClr val="bg1"/>
-                  </a:solidFill>
-                </a:rPr>
-                <a:t>1</a:t>
+                <a:rPr lang="en-US" altLang="zh-CN" sz="8000" b="1" dirty="0"/>
+                <a:t>(c) DSI-11-Gmax40 In Vivo</a:t>
               </a:r>
-              <a:endParaRPr lang="zh-CN" altLang="en-US" sz="6000" b="1">
-                <a:solidFill>
-                  <a:schemeClr val="bg1"/>
-                </a:solidFill>
-              </a:endParaRPr>
+              <a:endParaRPr lang="zh-CN" altLang="en-US" sz="8000" b="1" dirty="0"/>
             </a:p>
           </p:txBody>
         </p:sp>
-        <p:sp>
-          <p:nvSpPr>
-            <p:cNvPr id="2062" name="TextBox 17"/>
-            <p:cNvSpPr txBox="1">
-              <a:spLocks noChangeArrowheads="1"/>
-            </p:cNvSpPr>
+        <p:pic>
+          <p:nvPicPr>
+            <p:cNvPr id="51" name="图片 7"/>
+            <p:cNvPicPr>
+              <a:picLocks noChangeAspect="1"/>
+            </p:cNvPicPr>
             <p:nvPr/>
-          </p:nvSpPr>
+          </p:nvPicPr>
+          <p:blipFill>
+            <a:blip r:embed="rId17">
+              <a:extLst>
+                <a:ext uri="{28A0092B-C50C-407E-A947-70E740481C1C}">
+                  <a14:useLocalDpi xmlns:a14="http://schemas.microsoft.com/office/drawing/2010/main" val="0"/>
+                </a:ext>
+              </a:extLst>
+            </a:blip>
+            <a:stretch>
+              <a:fillRect/>
+            </a:stretch>
+          </p:blipFill>
           <p:spPr bwMode="auto">
             <a:xfrm>
-              <a:off x="4573588" y="9390063"/>
-              <a:ext cx="671512" cy="1016000"/>
+              <a:off x="13094725" y="8973617"/>
+              <a:ext cx="5158794" cy="5714999"/>
             </a:xfrm>
             <a:prstGeom prst="rect">
               <a:avLst/>
@@ -4822,1228 +5803,8 @@
               </a:ext>
             </a:extLst>
           </p:spPr>
-          <p:txBody>
-            <a:bodyPr>
-              <a:spAutoFit/>
-            </a:bodyPr>
-            <a:lstStyle>
-              <a:lvl1pPr eaLnBrk="0" hangingPunct="0">
-                <a:defRPr>
-                  <a:solidFill>
-                    <a:schemeClr val="tx1"/>
-                  </a:solidFill>
-                  <a:latin typeface="Arial" charset="0"/>
-                  <a:ea typeface="宋体" pitchFamily="2" charset="-122"/>
-                </a:defRPr>
-              </a:lvl1pPr>
-              <a:lvl2pPr marL="742950" indent="-285750" eaLnBrk="0" hangingPunct="0">
-                <a:defRPr>
-                  <a:solidFill>
-                    <a:schemeClr val="tx1"/>
-                  </a:solidFill>
-                  <a:latin typeface="Arial" charset="0"/>
-                  <a:ea typeface="宋体" pitchFamily="2" charset="-122"/>
-                </a:defRPr>
-              </a:lvl2pPr>
-              <a:lvl3pPr marL="1143000" indent="-228600" eaLnBrk="0" hangingPunct="0">
-                <a:defRPr>
-                  <a:solidFill>
-                    <a:schemeClr val="tx1"/>
-                  </a:solidFill>
-                  <a:latin typeface="Arial" charset="0"/>
-                  <a:ea typeface="宋体" pitchFamily="2" charset="-122"/>
-                </a:defRPr>
-              </a:lvl3pPr>
-              <a:lvl4pPr marL="1600200" indent="-228600" eaLnBrk="0" hangingPunct="0">
-                <a:defRPr>
-                  <a:solidFill>
-                    <a:schemeClr val="tx1"/>
-                  </a:solidFill>
-                  <a:latin typeface="Arial" charset="0"/>
-                  <a:ea typeface="宋体" pitchFamily="2" charset="-122"/>
-                </a:defRPr>
-              </a:lvl4pPr>
-              <a:lvl5pPr marL="2057400" indent="-228600" eaLnBrk="0" hangingPunct="0">
-                <a:defRPr>
-                  <a:solidFill>
-                    <a:schemeClr val="tx1"/>
-                  </a:solidFill>
-                  <a:latin typeface="Arial" charset="0"/>
-                  <a:ea typeface="宋体" pitchFamily="2" charset="-122"/>
-                </a:defRPr>
-              </a:lvl5pPr>
-              <a:lvl6pPr marL="2514600" indent="-228600" eaLnBrk="0" fontAlgn="base" hangingPunct="0">
-                <a:spcBef>
-                  <a:spcPct val="0"/>
-                </a:spcBef>
-                <a:spcAft>
-                  <a:spcPct val="0"/>
-                </a:spcAft>
-                <a:defRPr>
-                  <a:solidFill>
-                    <a:schemeClr val="tx1"/>
-                  </a:solidFill>
-                  <a:latin typeface="Arial" charset="0"/>
-                  <a:ea typeface="宋体" pitchFamily="2" charset="-122"/>
-                </a:defRPr>
-              </a:lvl6pPr>
-              <a:lvl7pPr marL="2971800" indent="-228600" eaLnBrk="0" fontAlgn="base" hangingPunct="0">
-                <a:spcBef>
-                  <a:spcPct val="0"/>
-                </a:spcBef>
-                <a:spcAft>
-                  <a:spcPct val="0"/>
-                </a:spcAft>
-                <a:defRPr>
-                  <a:solidFill>
-                    <a:schemeClr val="tx1"/>
-                  </a:solidFill>
-                  <a:latin typeface="Arial" charset="0"/>
-                  <a:ea typeface="宋体" pitchFamily="2" charset="-122"/>
-                </a:defRPr>
-              </a:lvl7pPr>
-              <a:lvl8pPr marL="3429000" indent="-228600" eaLnBrk="0" fontAlgn="base" hangingPunct="0">
-                <a:spcBef>
-                  <a:spcPct val="0"/>
-                </a:spcBef>
-                <a:spcAft>
-                  <a:spcPct val="0"/>
-                </a:spcAft>
-                <a:defRPr>
-                  <a:solidFill>
-                    <a:schemeClr val="tx1"/>
-                  </a:solidFill>
-                  <a:latin typeface="Arial" charset="0"/>
-                  <a:ea typeface="宋体" pitchFamily="2" charset="-122"/>
-                </a:defRPr>
-              </a:lvl8pPr>
-              <a:lvl9pPr marL="3886200" indent="-228600" eaLnBrk="0" fontAlgn="base" hangingPunct="0">
-                <a:spcBef>
-                  <a:spcPct val="0"/>
-                </a:spcBef>
-                <a:spcAft>
-                  <a:spcPct val="0"/>
-                </a:spcAft>
-                <a:defRPr>
-                  <a:solidFill>
-                    <a:schemeClr val="tx1"/>
-                  </a:solidFill>
-                  <a:latin typeface="Arial" charset="0"/>
-                  <a:ea typeface="宋体" pitchFamily="2" charset="-122"/>
-                </a:defRPr>
-              </a:lvl9pPr>
-            </a:lstStyle>
-            <a:p>
-              <a:pPr algn="ctr" eaLnBrk="1" hangingPunct="1"/>
-              <a:r>
-                <a:rPr lang="en-US" altLang="zh-CN" sz="6000" b="1">
-                  <a:solidFill>
-                    <a:schemeClr val="bg1"/>
-                  </a:solidFill>
-                </a:rPr>
-                <a:t>2</a:t>
-              </a:r>
-              <a:endParaRPr lang="zh-CN" altLang="en-US" sz="6000" b="1">
-                <a:solidFill>
-                  <a:schemeClr val="bg1"/>
-                </a:solidFill>
-              </a:endParaRPr>
-            </a:p>
-          </p:txBody>
-        </p:sp>
-        <p:sp>
-          <p:nvSpPr>
-            <p:cNvPr id="2063" name="TextBox 18"/>
-            <p:cNvSpPr txBox="1">
-              <a:spLocks noChangeArrowheads="1"/>
-            </p:cNvSpPr>
-            <p:nvPr/>
-          </p:nvSpPr>
-          <p:spPr bwMode="auto">
-            <a:xfrm>
-              <a:off x="9321800" y="9390063"/>
-              <a:ext cx="673100" cy="1016000"/>
-            </a:xfrm>
-            <a:prstGeom prst="rect">
-              <a:avLst/>
-            </a:prstGeom>
-            <a:noFill/>
-            <a:ln>
-              <a:noFill/>
-            </a:ln>
-            <a:extLst>
-              <a:ext uri="{909E8E84-426E-40DD-AFC4-6F175D3DCCD1}">
-                <a14:hiddenFill xmlns:a14="http://schemas.microsoft.com/office/drawing/2010/main">
-                  <a:solidFill>
-                    <a:srgbClr val="FFFFFF"/>
-                  </a:solidFill>
-                </a14:hiddenFill>
-              </a:ext>
-              <a:ext uri="{91240B29-F687-4F45-9708-019B960494DF}">
-                <a14:hiddenLine xmlns:a14="http://schemas.microsoft.com/office/drawing/2010/main" w="9525">
-                  <a:solidFill>
-                    <a:srgbClr val="000000"/>
-                  </a:solidFill>
-                  <a:miter lim="800000"/>
-                  <a:headEnd/>
-                  <a:tailEnd/>
-                </a14:hiddenLine>
-              </a:ext>
-            </a:extLst>
-          </p:spPr>
-          <p:txBody>
-            <a:bodyPr>
-              <a:spAutoFit/>
-            </a:bodyPr>
-            <a:lstStyle>
-              <a:lvl1pPr eaLnBrk="0" hangingPunct="0">
-                <a:defRPr>
-                  <a:solidFill>
-                    <a:schemeClr val="tx1"/>
-                  </a:solidFill>
-                  <a:latin typeface="Arial" charset="0"/>
-                  <a:ea typeface="宋体" pitchFamily="2" charset="-122"/>
-                </a:defRPr>
-              </a:lvl1pPr>
-              <a:lvl2pPr marL="742950" indent="-285750" eaLnBrk="0" hangingPunct="0">
-                <a:defRPr>
-                  <a:solidFill>
-                    <a:schemeClr val="tx1"/>
-                  </a:solidFill>
-                  <a:latin typeface="Arial" charset="0"/>
-                  <a:ea typeface="宋体" pitchFamily="2" charset="-122"/>
-                </a:defRPr>
-              </a:lvl2pPr>
-              <a:lvl3pPr marL="1143000" indent="-228600" eaLnBrk="0" hangingPunct="0">
-                <a:defRPr>
-                  <a:solidFill>
-                    <a:schemeClr val="tx1"/>
-                  </a:solidFill>
-                  <a:latin typeface="Arial" charset="0"/>
-                  <a:ea typeface="宋体" pitchFamily="2" charset="-122"/>
-                </a:defRPr>
-              </a:lvl3pPr>
-              <a:lvl4pPr marL="1600200" indent="-228600" eaLnBrk="0" hangingPunct="0">
-                <a:defRPr>
-                  <a:solidFill>
-                    <a:schemeClr val="tx1"/>
-                  </a:solidFill>
-                  <a:latin typeface="Arial" charset="0"/>
-                  <a:ea typeface="宋体" pitchFamily="2" charset="-122"/>
-                </a:defRPr>
-              </a:lvl4pPr>
-              <a:lvl5pPr marL="2057400" indent="-228600" eaLnBrk="0" hangingPunct="0">
-                <a:defRPr>
-                  <a:solidFill>
-                    <a:schemeClr val="tx1"/>
-                  </a:solidFill>
-                  <a:latin typeface="Arial" charset="0"/>
-                  <a:ea typeface="宋体" pitchFamily="2" charset="-122"/>
-                </a:defRPr>
-              </a:lvl5pPr>
-              <a:lvl6pPr marL="2514600" indent="-228600" eaLnBrk="0" fontAlgn="base" hangingPunct="0">
-                <a:spcBef>
-                  <a:spcPct val="0"/>
-                </a:spcBef>
-                <a:spcAft>
-                  <a:spcPct val="0"/>
-                </a:spcAft>
-                <a:defRPr>
-                  <a:solidFill>
-                    <a:schemeClr val="tx1"/>
-                  </a:solidFill>
-                  <a:latin typeface="Arial" charset="0"/>
-                  <a:ea typeface="宋体" pitchFamily="2" charset="-122"/>
-                </a:defRPr>
-              </a:lvl6pPr>
-              <a:lvl7pPr marL="2971800" indent="-228600" eaLnBrk="0" fontAlgn="base" hangingPunct="0">
-                <a:spcBef>
-                  <a:spcPct val="0"/>
-                </a:spcBef>
-                <a:spcAft>
-                  <a:spcPct val="0"/>
-                </a:spcAft>
-                <a:defRPr>
-                  <a:solidFill>
-                    <a:schemeClr val="tx1"/>
-                  </a:solidFill>
-                  <a:latin typeface="Arial" charset="0"/>
-                  <a:ea typeface="宋体" pitchFamily="2" charset="-122"/>
-                </a:defRPr>
-              </a:lvl7pPr>
-              <a:lvl8pPr marL="3429000" indent="-228600" eaLnBrk="0" fontAlgn="base" hangingPunct="0">
-                <a:spcBef>
-                  <a:spcPct val="0"/>
-                </a:spcBef>
-                <a:spcAft>
-                  <a:spcPct val="0"/>
-                </a:spcAft>
-                <a:defRPr>
-                  <a:solidFill>
-                    <a:schemeClr val="tx1"/>
-                  </a:solidFill>
-                  <a:latin typeface="Arial" charset="0"/>
-                  <a:ea typeface="宋体" pitchFamily="2" charset="-122"/>
-                </a:defRPr>
-              </a:lvl8pPr>
-              <a:lvl9pPr marL="3886200" indent="-228600" eaLnBrk="0" fontAlgn="base" hangingPunct="0">
-                <a:spcBef>
-                  <a:spcPct val="0"/>
-                </a:spcBef>
-                <a:spcAft>
-                  <a:spcPct val="0"/>
-                </a:spcAft>
-                <a:defRPr>
-                  <a:solidFill>
-                    <a:schemeClr val="tx1"/>
-                  </a:solidFill>
-                  <a:latin typeface="Arial" charset="0"/>
-                  <a:ea typeface="宋体" pitchFamily="2" charset="-122"/>
-                </a:defRPr>
-              </a:lvl9pPr>
-            </a:lstStyle>
-            <a:p>
-              <a:pPr algn="ctr" eaLnBrk="1" hangingPunct="1"/>
-              <a:r>
-                <a:rPr lang="en-US" altLang="zh-CN" sz="6000" b="1">
-                  <a:solidFill>
-                    <a:schemeClr val="bg1"/>
-                  </a:solidFill>
-                </a:rPr>
-                <a:t>4</a:t>
-              </a:r>
-              <a:endParaRPr lang="zh-CN" altLang="en-US" sz="6000" b="1">
-                <a:solidFill>
-                  <a:schemeClr val="bg1"/>
-                </a:solidFill>
-              </a:endParaRPr>
-            </a:p>
-          </p:txBody>
-        </p:sp>
-        <p:sp>
-          <p:nvSpPr>
-            <p:cNvPr id="2064" name="TextBox 19"/>
-            <p:cNvSpPr txBox="1">
-              <a:spLocks noChangeArrowheads="1"/>
-            </p:cNvSpPr>
-            <p:nvPr/>
-          </p:nvSpPr>
-          <p:spPr bwMode="auto">
-            <a:xfrm>
-              <a:off x="14077950" y="9390063"/>
-              <a:ext cx="673100" cy="1016000"/>
-            </a:xfrm>
-            <a:prstGeom prst="rect">
-              <a:avLst/>
-            </a:prstGeom>
-            <a:noFill/>
-            <a:ln>
-              <a:noFill/>
-            </a:ln>
-            <a:extLst>
-              <a:ext uri="{909E8E84-426E-40DD-AFC4-6F175D3DCCD1}">
-                <a14:hiddenFill xmlns:a14="http://schemas.microsoft.com/office/drawing/2010/main">
-                  <a:solidFill>
-                    <a:srgbClr val="FFFFFF"/>
-                  </a:solidFill>
-                </a14:hiddenFill>
-              </a:ext>
-              <a:ext uri="{91240B29-F687-4F45-9708-019B960494DF}">
-                <a14:hiddenLine xmlns:a14="http://schemas.microsoft.com/office/drawing/2010/main" w="9525">
-                  <a:solidFill>
-                    <a:srgbClr val="000000"/>
-                  </a:solidFill>
-                  <a:miter lim="800000"/>
-                  <a:headEnd/>
-                  <a:tailEnd/>
-                </a14:hiddenLine>
-              </a:ext>
-            </a:extLst>
-          </p:spPr>
-          <p:txBody>
-            <a:bodyPr>
-              <a:spAutoFit/>
-            </a:bodyPr>
-            <a:lstStyle>
-              <a:lvl1pPr eaLnBrk="0" hangingPunct="0">
-                <a:defRPr>
-                  <a:solidFill>
-                    <a:schemeClr val="tx1"/>
-                  </a:solidFill>
-                  <a:latin typeface="Arial" charset="0"/>
-                  <a:ea typeface="宋体" pitchFamily="2" charset="-122"/>
-                </a:defRPr>
-              </a:lvl1pPr>
-              <a:lvl2pPr marL="742950" indent="-285750" eaLnBrk="0" hangingPunct="0">
-                <a:defRPr>
-                  <a:solidFill>
-                    <a:schemeClr val="tx1"/>
-                  </a:solidFill>
-                  <a:latin typeface="Arial" charset="0"/>
-                  <a:ea typeface="宋体" pitchFamily="2" charset="-122"/>
-                </a:defRPr>
-              </a:lvl2pPr>
-              <a:lvl3pPr marL="1143000" indent="-228600" eaLnBrk="0" hangingPunct="0">
-                <a:defRPr>
-                  <a:solidFill>
-                    <a:schemeClr val="tx1"/>
-                  </a:solidFill>
-                  <a:latin typeface="Arial" charset="0"/>
-                  <a:ea typeface="宋体" pitchFamily="2" charset="-122"/>
-                </a:defRPr>
-              </a:lvl3pPr>
-              <a:lvl4pPr marL="1600200" indent="-228600" eaLnBrk="0" hangingPunct="0">
-                <a:defRPr>
-                  <a:solidFill>
-                    <a:schemeClr val="tx1"/>
-                  </a:solidFill>
-                  <a:latin typeface="Arial" charset="0"/>
-                  <a:ea typeface="宋体" pitchFamily="2" charset="-122"/>
-                </a:defRPr>
-              </a:lvl4pPr>
-              <a:lvl5pPr marL="2057400" indent="-228600" eaLnBrk="0" hangingPunct="0">
-                <a:defRPr>
-                  <a:solidFill>
-                    <a:schemeClr val="tx1"/>
-                  </a:solidFill>
-                  <a:latin typeface="Arial" charset="0"/>
-                  <a:ea typeface="宋体" pitchFamily="2" charset="-122"/>
-                </a:defRPr>
-              </a:lvl5pPr>
-              <a:lvl6pPr marL="2514600" indent="-228600" eaLnBrk="0" fontAlgn="base" hangingPunct="0">
-                <a:spcBef>
-                  <a:spcPct val="0"/>
-                </a:spcBef>
-                <a:spcAft>
-                  <a:spcPct val="0"/>
-                </a:spcAft>
-                <a:defRPr>
-                  <a:solidFill>
-                    <a:schemeClr val="tx1"/>
-                  </a:solidFill>
-                  <a:latin typeface="Arial" charset="0"/>
-                  <a:ea typeface="宋体" pitchFamily="2" charset="-122"/>
-                </a:defRPr>
-              </a:lvl6pPr>
-              <a:lvl7pPr marL="2971800" indent="-228600" eaLnBrk="0" fontAlgn="base" hangingPunct="0">
-                <a:spcBef>
-                  <a:spcPct val="0"/>
-                </a:spcBef>
-                <a:spcAft>
-                  <a:spcPct val="0"/>
-                </a:spcAft>
-                <a:defRPr>
-                  <a:solidFill>
-                    <a:schemeClr val="tx1"/>
-                  </a:solidFill>
-                  <a:latin typeface="Arial" charset="0"/>
-                  <a:ea typeface="宋体" pitchFamily="2" charset="-122"/>
-                </a:defRPr>
-              </a:lvl7pPr>
-              <a:lvl8pPr marL="3429000" indent="-228600" eaLnBrk="0" fontAlgn="base" hangingPunct="0">
-                <a:spcBef>
-                  <a:spcPct val="0"/>
-                </a:spcBef>
-                <a:spcAft>
-                  <a:spcPct val="0"/>
-                </a:spcAft>
-                <a:defRPr>
-                  <a:solidFill>
-                    <a:schemeClr val="tx1"/>
-                  </a:solidFill>
-                  <a:latin typeface="Arial" charset="0"/>
-                  <a:ea typeface="宋体" pitchFamily="2" charset="-122"/>
-                </a:defRPr>
-              </a:lvl8pPr>
-              <a:lvl9pPr marL="3886200" indent="-228600" eaLnBrk="0" fontAlgn="base" hangingPunct="0">
-                <a:spcBef>
-                  <a:spcPct val="0"/>
-                </a:spcBef>
-                <a:spcAft>
-                  <a:spcPct val="0"/>
-                </a:spcAft>
-                <a:defRPr>
-                  <a:solidFill>
-                    <a:schemeClr val="tx1"/>
-                  </a:solidFill>
-                  <a:latin typeface="Arial" charset="0"/>
-                  <a:ea typeface="宋体" pitchFamily="2" charset="-122"/>
-                </a:defRPr>
-              </a:lvl9pPr>
-            </a:lstStyle>
-            <a:p>
-              <a:pPr algn="ctr" eaLnBrk="1" hangingPunct="1"/>
-              <a:r>
-                <a:rPr lang="en-US" altLang="zh-CN" sz="6000" b="1">
-                  <a:solidFill>
-                    <a:schemeClr val="bg1"/>
-                  </a:solidFill>
-                </a:rPr>
-                <a:t>8</a:t>
-              </a:r>
-              <a:endParaRPr lang="zh-CN" altLang="en-US" sz="6000" b="1">
-                <a:solidFill>
-                  <a:schemeClr val="bg1"/>
-                </a:solidFill>
-              </a:endParaRPr>
-            </a:p>
-          </p:txBody>
-        </p:sp>
-        <p:sp>
-          <p:nvSpPr>
-            <p:cNvPr id="2067" name="TextBox 13"/>
-            <p:cNvSpPr txBox="1">
-              <a:spLocks noChangeArrowheads="1"/>
-            </p:cNvSpPr>
-            <p:nvPr/>
-          </p:nvSpPr>
-          <p:spPr bwMode="auto">
-            <a:xfrm>
-              <a:off x="-7453313" y="9439275"/>
-              <a:ext cx="2520950" cy="830263"/>
-            </a:xfrm>
-            <a:prstGeom prst="rect">
-              <a:avLst/>
-            </a:prstGeom>
-            <a:noFill/>
-            <a:ln>
-              <a:noFill/>
-            </a:ln>
-            <a:extLst>
-              <a:ext uri="{909E8E84-426E-40DD-AFC4-6F175D3DCCD1}">
-                <a14:hiddenFill xmlns:a14="http://schemas.microsoft.com/office/drawing/2010/main">
-                  <a:solidFill>
-                    <a:srgbClr val="FFFFFF"/>
-                  </a:solidFill>
-                </a14:hiddenFill>
-              </a:ext>
-              <a:ext uri="{91240B29-F687-4F45-9708-019B960494DF}">
-                <a14:hiddenLine xmlns:a14="http://schemas.microsoft.com/office/drawing/2010/main" w="9525">
-                  <a:solidFill>
-                    <a:srgbClr val="000000"/>
-                  </a:solidFill>
-                  <a:miter lim="800000"/>
-                  <a:headEnd/>
-                  <a:tailEnd/>
-                </a14:hiddenLine>
-              </a:ext>
-            </a:extLst>
-          </p:spPr>
-          <p:txBody>
-            <a:bodyPr>
-              <a:spAutoFit/>
-            </a:bodyPr>
-            <a:lstStyle>
-              <a:lvl1pPr eaLnBrk="0" hangingPunct="0">
-                <a:defRPr>
-                  <a:solidFill>
-                    <a:schemeClr val="tx1"/>
-                  </a:solidFill>
-                  <a:latin typeface="Arial" charset="0"/>
-                  <a:ea typeface="宋体" pitchFamily="2" charset="-122"/>
-                </a:defRPr>
-              </a:lvl1pPr>
-              <a:lvl2pPr marL="742950" indent="-285750" eaLnBrk="0" hangingPunct="0">
-                <a:defRPr>
-                  <a:solidFill>
-                    <a:schemeClr val="tx1"/>
-                  </a:solidFill>
-                  <a:latin typeface="Arial" charset="0"/>
-                  <a:ea typeface="宋体" pitchFamily="2" charset="-122"/>
-                </a:defRPr>
-              </a:lvl2pPr>
-              <a:lvl3pPr marL="1143000" indent="-228600" eaLnBrk="0" hangingPunct="0">
-                <a:defRPr>
-                  <a:solidFill>
-                    <a:schemeClr val="tx1"/>
-                  </a:solidFill>
-                  <a:latin typeface="Arial" charset="0"/>
-                  <a:ea typeface="宋体" pitchFamily="2" charset="-122"/>
-                </a:defRPr>
-              </a:lvl3pPr>
-              <a:lvl4pPr marL="1600200" indent="-228600" eaLnBrk="0" hangingPunct="0">
-                <a:defRPr>
-                  <a:solidFill>
-                    <a:schemeClr val="tx1"/>
-                  </a:solidFill>
-                  <a:latin typeface="Arial" charset="0"/>
-                  <a:ea typeface="宋体" pitchFamily="2" charset="-122"/>
-                </a:defRPr>
-              </a:lvl4pPr>
-              <a:lvl5pPr marL="2057400" indent="-228600" eaLnBrk="0" hangingPunct="0">
-                <a:defRPr>
-                  <a:solidFill>
-                    <a:schemeClr val="tx1"/>
-                  </a:solidFill>
-                  <a:latin typeface="Arial" charset="0"/>
-                  <a:ea typeface="宋体" pitchFamily="2" charset="-122"/>
-                </a:defRPr>
-              </a:lvl5pPr>
-              <a:lvl6pPr marL="2514600" indent="-228600" eaLnBrk="0" fontAlgn="base" hangingPunct="0">
-                <a:spcBef>
-                  <a:spcPct val="0"/>
-                </a:spcBef>
-                <a:spcAft>
-                  <a:spcPct val="0"/>
-                </a:spcAft>
-                <a:defRPr>
-                  <a:solidFill>
-                    <a:schemeClr val="tx1"/>
-                  </a:solidFill>
-                  <a:latin typeface="Arial" charset="0"/>
-                  <a:ea typeface="宋体" pitchFamily="2" charset="-122"/>
-                </a:defRPr>
-              </a:lvl6pPr>
-              <a:lvl7pPr marL="2971800" indent="-228600" eaLnBrk="0" fontAlgn="base" hangingPunct="0">
-                <a:spcBef>
-                  <a:spcPct val="0"/>
-                </a:spcBef>
-                <a:spcAft>
-                  <a:spcPct val="0"/>
-                </a:spcAft>
-                <a:defRPr>
-                  <a:solidFill>
-                    <a:schemeClr val="tx1"/>
-                  </a:solidFill>
-                  <a:latin typeface="Arial" charset="0"/>
-                  <a:ea typeface="宋体" pitchFamily="2" charset="-122"/>
-                </a:defRPr>
-              </a:lvl7pPr>
-              <a:lvl8pPr marL="3429000" indent="-228600" eaLnBrk="0" fontAlgn="base" hangingPunct="0">
-                <a:spcBef>
-                  <a:spcPct val="0"/>
-                </a:spcBef>
-                <a:spcAft>
-                  <a:spcPct val="0"/>
-                </a:spcAft>
-                <a:defRPr>
-                  <a:solidFill>
-                    <a:schemeClr val="tx1"/>
-                  </a:solidFill>
-                  <a:latin typeface="Arial" charset="0"/>
-                  <a:ea typeface="宋体" pitchFamily="2" charset="-122"/>
-                </a:defRPr>
-              </a:lvl8pPr>
-              <a:lvl9pPr marL="3886200" indent="-228600" eaLnBrk="0" fontAlgn="base" hangingPunct="0">
-                <a:spcBef>
-                  <a:spcPct val="0"/>
-                </a:spcBef>
-                <a:spcAft>
-                  <a:spcPct val="0"/>
-                </a:spcAft>
-                <a:defRPr>
-                  <a:solidFill>
-                    <a:schemeClr val="tx1"/>
-                  </a:solidFill>
-                  <a:latin typeface="Arial" charset="0"/>
-                  <a:ea typeface="宋体" pitchFamily="2" charset="-122"/>
-                </a:defRPr>
-              </a:lvl9pPr>
-            </a:lstStyle>
-            <a:p>
-              <a:pPr eaLnBrk="1" hangingPunct="1"/>
-              <a:r>
-                <a:rPr lang="en-US" altLang="zh-CN" sz="4800" b="1">
-                  <a:solidFill>
-                    <a:schemeClr val="bg1"/>
-                  </a:solidFill>
-                </a:rPr>
-                <a:t>Power:</a:t>
-              </a:r>
-              <a:endParaRPr lang="zh-CN" altLang="en-US" sz="4800" b="1">
-                <a:solidFill>
-                  <a:schemeClr val="bg1"/>
-                </a:solidFill>
-              </a:endParaRPr>
-            </a:p>
-          </p:txBody>
-        </p:sp>
+        </p:pic>
       </p:grpSp>
-      <p:sp>
-        <p:nvSpPr>
-          <p:cNvPr id="2065" name="TextBox 17"/>
-          <p:cNvSpPr txBox="1">
-            <a:spLocks noChangeArrowheads="1"/>
-          </p:cNvSpPr>
-          <p:nvPr/>
-        </p:nvSpPr>
-        <p:spPr bwMode="auto">
-          <a:xfrm>
-            <a:off x="-2419351" y="-891480"/>
-            <a:ext cx="13295313" cy="1015663"/>
-          </a:xfrm>
-          <a:prstGeom prst="rect">
-            <a:avLst/>
-          </a:prstGeom>
-          <a:noFill/>
-          <a:ln>
-            <a:noFill/>
-          </a:ln>
-          <a:extLst>
-            <a:ext uri="{909E8E84-426E-40DD-AFC4-6F175D3DCCD1}">
-              <a14:hiddenFill xmlns:a14="http://schemas.microsoft.com/office/drawing/2010/main">
-                <a:solidFill>
-                  <a:srgbClr val="FFFFFF"/>
-                </a:solidFill>
-              </a14:hiddenFill>
-            </a:ext>
-            <a:ext uri="{91240B29-F687-4F45-9708-019B960494DF}">
-              <a14:hiddenLine xmlns:a14="http://schemas.microsoft.com/office/drawing/2010/main" w="9525">
-                <a:solidFill>
-                  <a:srgbClr val="000000"/>
-                </a:solidFill>
-                <a:miter lim="800000"/>
-                <a:headEnd/>
-                <a:tailEnd/>
-              </a14:hiddenLine>
-            </a:ext>
-          </a:extLst>
-        </p:spPr>
-        <p:txBody>
-          <a:bodyPr wrap="square">
-            <a:spAutoFit/>
-          </a:bodyPr>
-          <a:lstStyle>
-            <a:lvl1pPr eaLnBrk="0" hangingPunct="0">
-              <a:defRPr>
-                <a:solidFill>
-                  <a:schemeClr val="tx1"/>
-                </a:solidFill>
-                <a:latin typeface="Arial" charset="0"/>
-                <a:ea typeface="宋体" pitchFamily="2" charset="-122"/>
-              </a:defRPr>
-            </a:lvl1pPr>
-            <a:lvl2pPr marL="742950" indent="-285750" eaLnBrk="0" hangingPunct="0">
-              <a:defRPr>
-                <a:solidFill>
-                  <a:schemeClr val="tx1"/>
-                </a:solidFill>
-                <a:latin typeface="Arial" charset="0"/>
-                <a:ea typeface="宋体" pitchFamily="2" charset="-122"/>
-              </a:defRPr>
-            </a:lvl2pPr>
-            <a:lvl3pPr marL="1143000" indent="-228600" eaLnBrk="0" hangingPunct="0">
-              <a:defRPr>
-                <a:solidFill>
-                  <a:schemeClr val="tx1"/>
-                </a:solidFill>
-                <a:latin typeface="Arial" charset="0"/>
-                <a:ea typeface="宋体" pitchFamily="2" charset="-122"/>
-              </a:defRPr>
-            </a:lvl3pPr>
-            <a:lvl4pPr marL="1600200" indent="-228600" eaLnBrk="0" hangingPunct="0">
-              <a:defRPr>
-                <a:solidFill>
-                  <a:schemeClr val="tx1"/>
-                </a:solidFill>
-                <a:latin typeface="Arial" charset="0"/>
-                <a:ea typeface="宋体" pitchFamily="2" charset="-122"/>
-              </a:defRPr>
-            </a:lvl4pPr>
-            <a:lvl5pPr marL="2057400" indent="-228600" eaLnBrk="0" hangingPunct="0">
-              <a:defRPr>
-                <a:solidFill>
-                  <a:schemeClr val="tx1"/>
-                </a:solidFill>
-                <a:latin typeface="Arial" charset="0"/>
-                <a:ea typeface="宋体" pitchFamily="2" charset="-122"/>
-              </a:defRPr>
-            </a:lvl5pPr>
-            <a:lvl6pPr marL="2514600" indent="-228600" eaLnBrk="0" fontAlgn="base" hangingPunct="0">
-              <a:spcBef>
-                <a:spcPct val="0"/>
-              </a:spcBef>
-              <a:spcAft>
-                <a:spcPct val="0"/>
-              </a:spcAft>
-              <a:defRPr>
-                <a:solidFill>
-                  <a:schemeClr val="tx1"/>
-                </a:solidFill>
-                <a:latin typeface="Arial" charset="0"/>
-                <a:ea typeface="宋体" pitchFamily="2" charset="-122"/>
-              </a:defRPr>
-            </a:lvl6pPr>
-            <a:lvl7pPr marL="2971800" indent="-228600" eaLnBrk="0" fontAlgn="base" hangingPunct="0">
-              <a:spcBef>
-                <a:spcPct val="0"/>
-              </a:spcBef>
-              <a:spcAft>
-                <a:spcPct val="0"/>
-              </a:spcAft>
-              <a:defRPr>
-                <a:solidFill>
-                  <a:schemeClr val="tx1"/>
-                </a:solidFill>
-                <a:latin typeface="Arial" charset="0"/>
-                <a:ea typeface="宋体" pitchFamily="2" charset="-122"/>
-              </a:defRPr>
-            </a:lvl7pPr>
-            <a:lvl8pPr marL="3429000" indent="-228600" eaLnBrk="0" fontAlgn="base" hangingPunct="0">
-              <a:spcBef>
-                <a:spcPct val="0"/>
-              </a:spcBef>
-              <a:spcAft>
-                <a:spcPct val="0"/>
-              </a:spcAft>
-              <a:defRPr>
-                <a:solidFill>
-                  <a:schemeClr val="tx1"/>
-                </a:solidFill>
-                <a:latin typeface="Arial" charset="0"/>
-                <a:ea typeface="宋体" pitchFamily="2" charset="-122"/>
-              </a:defRPr>
-            </a:lvl8pPr>
-            <a:lvl9pPr marL="3886200" indent="-228600" eaLnBrk="0" fontAlgn="base" hangingPunct="0">
-              <a:spcBef>
-                <a:spcPct val="0"/>
-              </a:spcBef>
-              <a:spcAft>
-                <a:spcPct val="0"/>
-              </a:spcAft>
-              <a:defRPr>
-                <a:solidFill>
-                  <a:schemeClr val="tx1"/>
-                </a:solidFill>
-                <a:latin typeface="Arial" charset="0"/>
-                <a:ea typeface="宋体" pitchFamily="2" charset="-122"/>
-              </a:defRPr>
-            </a:lvl9pPr>
-          </a:lstStyle>
-          <a:p>
-            <a:pPr algn="ctr" eaLnBrk="1" hangingPunct="1"/>
-            <a:r>
-              <a:rPr lang="en-US" altLang="zh-CN" sz="6000" b="1" dirty="0" smtClean="0">
-                <a:solidFill>
-                  <a:schemeClr val="bg1"/>
-                </a:solidFill>
-              </a:rPr>
-              <a:t>(a) DSI-11 </a:t>
-            </a:r>
-            <a:r>
-              <a:rPr lang="en-US" altLang="zh-CN" sz="6000" b="1" dirty="0">
-                <a:solidFill>
-                  <a:schemeClr val="bg1"/>
-                </a:solidFill>
-              </a:rPr>
-              <a:t>Ex </a:t>
-            </a:r>
-            <a:r>
-              <a:rPr lang="en-US" altLang="zh-CN" sz="6000" b="1" dirty="0" smtClean="0">
-                <a:solidFill>
-                  <a:schemeClr val="bg1"/>
-                </a:solidFill>
-              </a:rPr>
-              <a:t>Vivo</a:t>
-            </a:r>
-            <a:endParaRPr lang="zh-CN" altLang="en-US" sz="6000" b="1" dirty="0">
-              <a:solidFill>
-                <a:schemeClr val="bg1"/>
-              </a:solidFill>
-            </a:endParaRPr>
-          </a:p>
-        </p:txBody>
-      </p:sp>
-      <p:sp>
-        <p:nvSpPr>
-          <p:cNvPr id="2066" name="TextBox 17"/>
-          <p:cNvSpPr txBox="1">
-            <a:spLocks noChangeArrowheads="1"/>
-          </p:cNvSpPr>
-          <p:nvPr/>
-        </p:nvSpPr>
-        <p:spPr bwMode="auto">
-          <a:xfrm>
-            <a:off x="-3260526" y="4247793"/>
-            <a:ext cx="14977663" cy="1015663"/>
-          </a:xfrm>
-          <a:prstGeom prst="rect">
-            <a:avLst/>
-          </a:prstGeom>
-          <a:noFill/>
-          <a:ln>
-            <a:noFill/>
-          </a:ln>
-          <a:extLst>
-            <a:ext uri="{909E8E84-426E-40DD-AFC4-6F175D3DCCD1}">
-              <a14:hiddenFill xmlns:a14="http://schemas.microsoft.com/office/drawing/2010/main">
-                <a:solidFill>
-                  <a:srgbClr val="FFFFFF"/>
-                </a:solidFill>
-              </a14:hiddenFill>
-            </a:ext>
-            <a:ext uri="{91240B29-F687-4F45-9708-019B960494DF}">
-              <a14:hiddenLine xmlns:a14="http://schemas.microsoft.com/office/drawing/2010/main" w="9525">
-                <a:solidFill>
-                  <a:srgbClr val="000000"/>
-                </a:solidFill>
-                <a:miter lim="800000"/>
-                <a:headEnd/>
-                <a:tailEnd/>
-              </a14:hiddenLine>
-            </a:ext>
-          </a:extLst>
-        </p:spPr>
-        <p:txBody>
-          <a:bodyPr wrap="square">
-            <a:spAutoFit/>
-          </a:bodyPr>
-          <a:lstStyle>
-            <a:lvl1pPr eaLnBrk="0" hangingPunct="0">
-              <a:defRPr>
-                <a:solidFill>
-                  <a:schemeClr val="tx1"/>
-                </a:solidFill>
-                <a:latin typeface="Arial" charset="0"/>
-                <a:ea typeface="宋体" pitchFamily="2" charset="-122"/>
-              </a:defRPr>
-            </a:lvl1pPr>
-            <a:lvl2pPr marL="742950" indent="-285750" eaLnBrk="0" hangingPunct="0">
-              <a:defRPr>
-                <a:solidFill>
-                  <a:schemeClr val="tx1"/>
-                </a:solidFill>
-                <a:latin typeface="Arial" charset="0"/>
-                <a:ea typeface="宋体" pitchFamily="2" charset="-122"/>
-              </a:defRPr>
-            </a:lvl2pPr>
-            <a:lvl3pPr marL="1143000" indent="-228600" eaLnBrk="0" hangingPunct="0">
-              <a:defRPr>
-                <a:solidFill>
-                  <a:schemeClr val="tx1"/>
-                </a:solidFill>
-                <a:latin typeface="Arial" charset="0"/>
-                <a:ea typeface="宋体" pitchFamily="2" charset="-122"/>
-              </a:defRPr>
-            </a:lvl3pPr>
-            <a:lvl4pPr marL="1600200" indent="-228600" eaLnBrk="0" hangingPunct="0">
-              <a:defRPr>
-                <a:solidFill>
-                  <a:schemeClr val="tx1"/>
-                </a:solidFill>
-                <a:latin typeface="Arial" charset="0"/>
-                <a:ea typeface="宋体" pitchFamily="2" charset="-122"/>
-              </a:defRPr>
-            </a:lvl4pPr>
-            <a:lvl5pPr marL="2057400" indent="-228600" eaLnBrk="0" hangingPunct="0">
-              <a:defRPr>
-                <a:solidFill>
-                  <a:schemeClr val="tx1"/>
-                </a:solidFill>
-                <a:latin typeface="Arial" charset="0"/>
-                <a:ea typeface="宋体" pitchFamily="2" charset="-122"/>
-              </a:defRPr>
-            </a:lvl5pPr>
-            <a:lvl6pPr marL="2514600" indent="-228600" eaLnBrk="0" fontAlgn="base" hangingPunct="0">
-              <a:spcBef>
-                <a:spcPct val="0"/>
-              </a:spcBef>
-              <a:spcAft>
-                <a:spcPct val="0"/>
-              </a:spcAft>
-              <a:defRPr>
-                <a:solidFill>
-                  <a:schemeClr val="tx1"/>
-                </a:solidFill>
-                <a:latin typeface="Arial" charset="0"/>
-                <a:ea typeface="宋体" pitchFamily="2" charset="-122"/>
-              </a:defRPr>
-            </a:lvl6pPr>
-            <a:lvl7pPr marL="2971800" indent="-228600" eaLnBrk="0" fontAlgn="base" hangingPunct="0">
-              <a:spcBef>
-                <a:spcPct val="0"/>
-              </a:spcBef>
-              <a:spcAft>
-                <a:spcPct val="0"/>
-              </a:spcAft>
-              <a:defRPr>
-                <a:solidFill>
-                  <a:schemeClr val="tx1"/>
-                </a:solidFill>
-                <a:latin typeface="Arial" charset="0"/>
-                <a:ea typeface="宋体" pitchFamily="2" charset="-122"/>
-              </a:defRPr>
-            </a:lvl7pPr>
-            <a:lvl8pPr marL="3429000" indent="-228600" eaLnBrk="0" fontAlgn="base" hangingPunct="0">
-              <a:spcBef>
-                <a:spcPct val="0"/>
-              </a:spcBef>
-              <a:spcAft>
-                <a:spcPct val="0"/>
-              </a:spcAft>
-              <a:defRPr>
-                <a:solidFill>
-                  <a:schemeClr val="tx1"/>
-                </a:solidFill>
-                <a:latin typeface="Arial" charset="0"/>
-                <a:ea typeface="宋体" pitchFamily="2" charset="-122"/>
-              </a:defRPr>
-            </a:lvl8pPr>
-            <a:lvl9pPr marL="3886200" indent="-228600" eaLnBrk="0" fontAlgn="base" hangingPunct="0">
-              <a:spcBef>
-                <a:spcPct val="0"/>
-              </a:spcBef>
-              <a:spcAft>
-                <a:spcPct val="0"/>
-              </a:spcAft>
-              <a:defRPr>
-                <a:solidFill>
-                  <a:schemeClr val="tx1"/>
-                </a:solidFill>
-                <a:latin typeface="Arial" charset="0"/>
-                <a:ea typeface="宋体" pitchFamily="2" charset="-122"/>
-              </a:defRPr>
-            </a:lvl9pPr>
-          </a:lstStyle>
-          <a:p>
-            <a:pPr algn="ctr" eaLnBrk="1" hangingPunct="1"/>
-            <a:r>
-              <a:rPr lang="en-US" altLang="zh-CN" sz="6000" b="1" dirty="0" smtClean="0">
-                <a:solidFill>
-                  <a:schemeClr val="bg1"/>
-                </a:solidFill>
-              </a:rPr>
-              <a:t>(b) </a:t>
-            </a:r>
-            <a:r>
-              <a:rPr lang="en-US" altLang="zh-CN" sz="6000" b="1" dirty="0" smtClean="0">
-                <a:solidFill>
-                  <a:schemeClr val="bg1"/>
-                </a:solidFill>
-              </a:rPr>
-              <a:t>DSI-11-Gmax225 </a:t>
-            </a:r>
-            <a:r>
-              <a:rPr lang="en-US" altLang="zh-CN" sz="6000" b="1" dirty="0">
-                <a:solidFill>
-                  <a:schemeClr val="bg1"/>
-                </a:solidFill>
-              </a:rPr>
-              <a:t>In </a:t>
-            </a:r>
-            <a:r>
-              <a:rPr lang="en-US" altLang="zh-CN" sz="6000" b="1" dirty="0" smtClean="0">
-                <a:solidFill>
-                  <a:schemeClr val="bg1"/>
-                </a:solidFill>
-              </a:rPr>
-              <a:t>Vivo</a:t>
-            </a:r>
-            <a:endParaRPr lang="zh-CN" altLang="en-US" sz="6000" b="1" dirty="0">
-              <a:solidFill>
-                <a:schemeClr val="bg1"/>
-              </a:solidFill>
-            </a:endParaRPr>
-          </a:p>
-        </p:txBody>
-      </p:sp>
-      <p:sp>
-        <p:nvSpPr>
-          <p:cNvPr id="28" name="TextBox 17"/>
-          <p:cNvSpPr txBox="1">
-            <a:spLocks noChangeArrowheads="1"/>
-          </p:cNvSpPr>
-          <p:nvPr/>
-        </p:nvSpPr>
-        <p:spPr bwMode="auto">
-          <a:xfrm>
-            <a:off x="-3008498" y="9425002"/>
-            <a:ext cx="14473607" cy="1015663"/>
-          </a:xfrm>
-          <a:prstGeom prst="rect">
-            <a:avLst/>
-          </a:prstGeom>
-          <a:noFill/>
-          <a:ln>
-            <a:noFill/>
-          </a:ln>
-          <a:extLst>
-            <a:ext uri="{909E8E84-426E-40DD-AFC4-6F175D3DCCD1}">
-              <a14:hiddenFill xmlns:a14="http://schemas.microsoft.com/office/drawing/2010/main">
-                <a:solidFill>
-                  <a:srgbClr val="FFFFFF"/>
-                </a:solidFill>
-              </a14:hiddenFill>
-            </a:ext>
-            <a:ext uri="{91240B29-F687-4F45-9708-019B960494DF}">
-              <a14:hiddenLine xmlns:a14="http://schemas.microsoft.com/office/drawing/2010/main" w="9525">
-                <a:solidFill>
-                  <a:srgbClr val="000000"/>
-                </a:solidFill>
-                <a:miter lim="800000"/>
-                <a:headEnd/>
-                <a:tailEnd/>
-              </a14:hiddenLine>
-            </a:ext>
-          </a:extLst>
-        </p:spPr>
-        <p:txBody>
-          <a:bodyPr wrap="square">
-            <a:spAutoFit/>
-          </a:bodyPr>
-          <a:lstStyle>
-            <a:lvl1pPr eaLnBrk="0" hangingPunct="0">
-              <a:defRPr>
-                <a:solidFill>
-                  <a:schemeClr val="tx1"/>
-                </a:solidFill>
-                <a:latin typeface="Arial" charset="0"/>
-                <a:ea typeface="宋体" pitchFamily="2" charset="-122"/>
-              </a:defRPr>
-            </a:lvl1pPr>
-            <a:lvl2pPr marL="742950" indent="-285750" eaLnBrk="0" hangingPunct="0">
-              <a:defRPr>
-                <a:solidFill>
-                  <a:schemeClr val="tx1"/>
-                </a:solidFill>
-                <a:latin typeface="Arial" charset="0"/>
-                <a:ea typeface="宋体" pitchFamily="2" charset="-122"/>
-              </a:defRPr>
-            </a:lvl2pPr>
-            <a:lvl3pPr marL="1143000" indent="-228600" eaLnBrk="0" hangingPunct="0">
-              <a:defRPr>
-                <a:solidFill>
-                  <a:schemeClr val="tx1"/>
-                </a:solidFill>
-                <a:latin typeface="Arial" charset="0"/>
-                <a:ea typeface="宋体" pitchFamily="2" charset="-122"/>
-              </a:defRPr>
-            </a:lvl3pPr>
-            <a:lvl4pPr marL="1600200" indent="-228600" eaLnBrk="0" hangingPunct="0">
-              <a:defRPr>
-                <a:solidFill>
-                  <a:schemeClr val="tx1"/>
-                </a:solidFill>
-                <a:latin typeface="Arial" charset="0"/>
-                <a:ea typeface="宋体" pitchFamily="2" charset="-122"/>
-              </a:defRPr>
-            </a:lvl4pPr>
-            <a:lvl5pPr marL="2057400" indent="-228600" eaLnBrk="0" hangingPunct="0">
-              <a:defRPr>
-                <a:solidFill>
-                  <a:schemeClr val="tx1"/>
-                </a:solidFill>
-                <a:latin typeface="Arial" charset="0"/>
-                <a:ea typeface="宋体" pitchFamily="2" charset="-122"/>
-              </a:defRPr>
-            </a:lvl5pPr>
-            <a:lvl6pPr marL="2514600" indent="-228600" eaLnBrk="0" fontAlgn="base" hangingPunct="0">
-              <a:spcBef>
-                <a:spcPct val="0"/>
-              </a:spcBef>
-              <a:spcAft>
-                <a:spcPct val="0"/>
-              </a:spcAft>
-              <a:defRPr>
-                <a:solidFill>
-                  <a:schemeClr val="tx1"/>
-                </a:solidFill>
-                <a:latin typeface="Arial" charset="0"/>
-                <a:ea typeface="宋体" pitchFamily="2" charset="-122"/>
-              </a:defRPr>
-            </a:lvl6pPr>
-            <a:lvl7pPr marL="2971800" indent="-228600" eaLnBrk="0" fontAlgn="base" hangingPunct="0">
-              <a:spcBef>
-                <a:spcPct val="0"/>
-              </a:spcBef>
-              <a:spcAft>
-                <a:spcPct val="0"/>
-              </a:spcAft>
-              <a:defRPr>
-                <a:solidFill>
-                  <a:schemeClr val="tx1"/>
-                </a:solidFill>
-                <a:latin typeface="Arial" charset="0"/>
-                <a:ea typeface="宋体" pitchFamily="2" charset="-122"/>
-              </a:defRPr>
-            </a:lvl7pPr>
-            <a:lvl8pPr marL="3429000" indent="-228600" eaLnBrk="0" fontAlgn="base" hangingPunct="0">
-              <a:spcBef>
-                <a:spcPct val="0"/>
-              </a:spcBef>
-              <a:spcAft>
-                <a:spcPct val="0"/>
-              </a:spcAft>
-              <a:defRPr>
-                <a:solidFill>
-                  <a:schemeClr val="tx1"/>
-                </a:solidFill>
-                <a:latin typeface="Arial" charset="0"/>
-                <a:ea typeface="宋体" pitchFamily="2" charset="-122"/>
-              </a:defRPr>
-            </a:lvl8pPr>
-            <a:lvl9pPr marL="3886200" indent="-228600" eaLnBrk="0" fontAlgn="base" hangingPunct="0">
-              <a:spcBef>
-                <a:spcPct val="0"/>
-              </a:spcBef>
-              <a:spcAft>
-                <a:spcPct val="0"/>
-              </a:spcAft>
-              <a:defRPr>
-                <a:solidFill>
-                  <a:schemeClr val="tx1"/>
-                </a:solidFill>
-                <a:latin typeface="Arial" charset="0"/>
-                <a:ea typeface="宋体" pitchFamily="2" charset="-122"/>
-              </a:defRPr>
-            </a:lvl9pPr>
-          </a:lstStyle>
-          <a:p>
-            <a:pPr algn="ctr" eaLnBrk="1" hangingPunct="1"/>
-            <a:r>
-              <a:rPr lang="en-US" altLang="zh-CN" sz="6000" b="1" dirty="0" smtClean="0">
-                <a:solidFill>
-                  <a:schemeClr val="bg1"/>
-                </a:solidFill>
-              </a:rPr>
-              <a:t>(c) </a:t>
-            </a:r>
-            <a:r>
-              <a:rPr lang="en-US" altLang="zh-CN" sz="6000" b="1" dirty="0" smtClean="0">
-                <a:solidFill>
-                  <a:schemeClr val="bg1"/>
-                </a:solidFill>
-              </a:rPr>
-              <a:t>DSI-11-Gmax40 In Vivo</a:t>
-            </a:r>
-            <a:endParaRPr lang="zh-CN" altLang="en-US" sz="6000" b="1" dirty="0">
-              <a:solidFill>
-                <a:schemeClr val="bg1"/>
-              </a:solidFill>
-            </a:endParaRPr>
-          </a:p>
-        </p:txBody>
-      </p:sp>
-      <p:pic>
-        <p:nvPicPr>
-          <p:cNvPr id="31" name="图片 30"/>
-          <p:cNvPicPr>
-            <a:picLocks noChangeAspect="1"/>
-          </p:cNvPicPr>
-          <p:nvPr/>
-        </p:nvPicPr>
-        <p:blipFill>
-          <a:blip r:embed="rId17" cstate="print">
-            <a:extLst>
-              <a:ext uri="{28A0092B-C50C-407E-A947-70E740481C1C}">
-                <a14:useLocalDpi xmlns:a14="http://schemas.microsoft.com/office/drawing/2010/main" val="0"/>
-              </a:ext>
-            </a:extLst>
-          </a:blip>
-          <a:stretch>
-            <a:fillRect/>
-          </a:stretch>
-        </p:blipFill>
-        <p:spPr>
-          <a:xfrm>
-            <a:off x="15322602" y="9118774"/>
-            <a:ext cx="1418750" cy="1511026"/>
-          </a:xfrm>
-          <a:prstGeom prst="rect">
-            <a:avLst/>
-          </a:prstGeom>
-        </p:spPr>
-      </p:pic>
     </p:spTree>
   </p:cSld>
   <p:clrMapOvr>

</xml_diff>